<commit_message>
leave absent going on 11/2/ 0319
</commit_message>
<xml_diff>
--- a/bk/New Microsoft PowerPoint Presentation.pptx
+++ b/bk/New Microsoft PowerPoint Presentation.pptx
@@ -5,7 +5,7 @@
     <p:sldMasterId id="2147483660" r:id="rId1"/>
   </p:sldMasterIdLst>
   <p:notesMasterIdLst>
-    <p:notesMasterId r:id="rId18"/>
+    <p:notesMasterId r:id="rId19"/>
   </p:notesMasterIdLst>
   <p:sldIdLst>
     <p:sldId id="256" r:id="rId2"/>
@@ -17,13 +17,14 @@
     <p:sldId id="274" r:id="rId8"/>
     <p:sldId id="275" r:id="rId9"/>
     <p:sldId id="276" r:id="rId10"/>
-    <p:sldId id="257" r:id="rId11"/>
-    <p:sldId id="263" r:id="rId12"/>
-    <p:sldId id="264" r:id="rId13"/>
-    <p:sldId id="273" r:id="rId14"/>
-    <p:sldId id="268" r:id="rId15"/>
-    <p:sldId id="269" r:id="rId16"/>
-    <p:sldId id="271" r:id="rId17"/>
+    <p:sldId id="277" r:id="rId11"/>
+    <p:sldId id="257" r:id="rId12"/>
+    <p:sldId id="263" r:id="rId13"/>
+    <p:sldId id="264" r:id="rId14"/>
+    <p:sldId id="273" r:id="rId15"/>
+    <p:sldId id="268" r:id="rId16"/>
+    <p:sldId id="269" r:id="rId17"/>
+    <p:sldId id="271" r:id="rId18"/>
   </p:sldIdLst>
   <p:sldSz cx="18288000" cy="10287000"/>
   <p:notesSz cx="6858000" cy="9144000"/>
@@ -212,7 +213,7 @@
           <a:p>
             <a:fld id="{9FD30752-513D-44A0-81D0-95D194C0B629}" type="datetimeFigureOut">
               <a:rPr lang="en-US" smtClean="0"/>
-              <a:t>1/31/2025</a:t>
+              <a:t>2/10/2025</a:t>
             </a:fld>
             <a:endParaRPr lang="en-US"/>
           </a:p>
@@ -779,6 +780,114 @@
 </p:notes>
 </file>
 
+<file path=ppt/notesSlides/notesSlide4.xml><?xml version="1.0" encoding="utf-8"?>
+<p:notes xmlns:a="http://schemas.openxmlformats.org/drawingml/2006/main" xmlns:r="http://schemas.openxmlformats.org/officeDocument/2006/relationships" xmlns:p="http://schemas.openxmlformats.org/presentationml/2006/main">
+  <p:cSld>
+    <p:spTree>
+      <p:nvGrpSpPr>
+        <p:cNvPr id="1" name="">
+          <a:extLst>
+            <a:ext uri="{FF2B5EF4-FFF2-40B4-BE49-F238E27FC236}">
+              <a16:creationId xmlns:a16="http://schemas.microsoft.com/office/drawing/2014/main" id="{2FE2A764-E395-E5EF-C9BE-A08BEE0AF765}"/>
+            </a:ext>
+          </a:extLst>
+        </p:cNvPr>
+        <p:cNvGrpSpPr/>
+        <p:nvPr/>
+      </p:nvGrpSpPr>
+      <p:grpSpPr>
+        <a:xfrm>
+          <a:off x="0" y="0"/>
+          <a:ext cx="0" cy="0"/>
+          <a:chOff x="0" y="0"/>
+          <a:chExt cx="0" cy="0"/>
+        </a:xfrm>
+      </p:grpSpPr>
+      <p:sp>
+        <p:nvSpPr>
+          <p:cNvPr id="2" name="Slide Image Placeholder 1">
+            <a:extLst>
+              <a:ext uri="{FF2B5EF4-FFF2-40B4-BE49-F238E27FC236}">
+                <a16:creationId xmlns:a16="http://schemas.microsoft.com/office/drawing/2014/main" id="{EB6F1804-C22B-E607-44BE-D382B456DB15}"/>
+              </a:ext>
+            </a:extLst>
+          </p:cNvPr>
+          <p:cNvSpPr>
+            <a:spLocks noGrp="1" noRot="1" noChangeAspect="1"/>
+          </p:cNvSpPr>
+          <p:nvPr>
+            <p:ph type="sldImg"/>
+          </p:nvPr>
+        </p:nvSpPr>
+        <p:spPr/>
+      </p:sp>
+      <p:sp>
+        <p:nvSpPr>
+          <p:cNvPr id="3" name="Notes Placeholder 2">
+            <a:extLst>
+              <a:ext uri="{FF2B5EF4-FFF2-40B4-BE49-F238E27FC236}">
+                <a16:creationId xmlns:a16="http://schemas.microsoft.com/office/drawing/2014/main" id="{4E51F339-69F2-3BEA-B747-9831E5E1E85E}"/>
+              </a:ext>
+            </a:extLst>
+          </p:cNvPr>
+          <p:cNvSpPr>
+            <a:spLocks noGrp="1"/>
+          </p:cNvSpPr>
+          <p:nvPr>
+            <p:ph type="body" idx="1"/>
+          </p:nvPr>
+        </p:nvSpPr>
+        <p:spPr/>
+        <p:txBody>
+          <a:bodyPr/>
+          <a:lstStyle/>
+          <a:p>
+            <a:endParaRPr lang="en-US" dirty="0"/>
+          </a:p>
+        </p:txBody>
+      </p:sp>
+      <p:sp>
+        <p:nvSpPr>
+          <p:cNvPr id="4" name="Slide Number Placeholder 3">
+            <a:extLst>
+              <a:ext uri="{FF2B5EF4-FFF2-40B4-BE49-F238E27FC236}">
+                <a16:creationId xmlns:a16="http://schemas.microsoft.com/office/drawing/2014/main" id="{C244049D-E959-EC98-6D65-26A5044D11ED}"/>
+              </a:ext>
+            </a:extLst>
+          </p:cNvPr>
+          <p:cNvSpPr>
+            <a:spLocks noGrp="1"/>
+          </p:cNvSpPr>
+          <p:nvPr>
+            <p:ph type="sldNum" sz="quarter" idx="5"/>
+          </p:nvPr>
+        </p:nvSpPr>
+        <p:spPr/>
+        <p:txBody>
+          <a:bodyPr/>
+          <a:lstStyle/>
+          <a:p>
+            <a:fld id="{DF4BE9C7-5227-40EC-9F7D-1882895FDE90}" type="slidenum">
+              <a:rPr lang="en-US" smtClean="0"/>
+              <a:t>10</a:t>
+            </a:fld>
+            <a:endParaRPr lang="en-US"/>
+          </a:p>
+        </p:txBody>
+      </p:sp>
+    </p:spTree>
+    <p:extLst>
+      <p:ext uri="{BB962C8B-B14F-4D97-AF65-F5344CB8AC3E}">
+        <p14:creationId xmlns:p14="http://schemas.microsoft.com/office/powerpoint/2010/main" val="1967886356"/>
+      </p:ext>
+    </p:extLst>
+  </p:cSld>
+  <p:clrMapOvr>
+    <a:masterClrMapping/>
+  </p:clrMapOvr>
+</p:notes>
+</file>
+
 <file path=ppt/slideLayouts/slideLayout1.xml><?xml version="1.0" encoding="utf-8"?>
 <p:sldLayout xmlns:a="http://schemas.openxmlformats.org/drawingml/2006/main" xmlns:r="http://schemas.openxmlformats.org/officeDocument/2006/relationships" xmlns:p="http://schemas.openxmlformats.org/presentationml/2006/main" type="title" preserve="1">
   <p:cSld name="Title Slide">
@@ -910,7 +1019,7 @@
           <a:p>
             <a:fld id="{6979B424-ED28-4BEC-8A28-BF427314F3CE}" type="datetimeFigureOut">
               <a:rPr lang="en-US" smtClean="0"/>
-              <a:t>1/31/2025</a:t>
+              <a:t>2/10/2025</a:t>
             </a:fld>
             <a:endParaRPr lang="en-US"/>
           </a:p>
@@ -1080,7 +1189,7 @@
           <a:p>
             <a:fld id="{6979B424-ED28-4BEC-8A28-BF427314F3CE}" type="datetimeFigureOut">
               <a:rPr lang="en-US" smtClean="0"/>
-              <a:t>1/31/2025</a:t>
+              <a:t>2/10/2025</a:t>
             </a:fld>
             <a:endParaRPr lang="en-US"/>
           </a:p>
@@ -1260,7 +1369,7 @@
           <a:p>
             <a:fld id="{6979B424-ED28-4BEC-8A28-BF427314F3CE}" type="datetimeFigureOut">
               <a:rPr lang="en-US" smtClean="0"/>
-              <a:t>1/31/2025</a:t>
+              <a:t>2/10/2025</a:t>
             </a:fld>
             <a:endParaRPr lang="en-US"/>
           </a:p>
@@ -1430,7 +1539,7 @@
           <a:p>
             <a:fld id="{6979B424-ED28-4BEC-8A28-BF427314F3CE}" type="datetimeFigureOut">
               <a:rPr lang="en-US" smtClean="0"/>
-              <a:t>1/31/2025</a:t>
+              <a:t>2/10/2025</a:t>
             </a:fld>
             <a:endParaRPr lang="en-US"/>
           </a:p>
@@ -1676,7 +1785,7 @@
           <a:p>
             <a:fld id="{6979B424-ED28-4BEC-8A28-BF427314F3CE}" type="datetimeFigureOut">
               <a:rPr lang="en-US" smtClean="0"/>
-              <a:t>1/31/2025</a:t>
+              <a:t>2/10/2025</a:t>
             </a:fld>
             <a:endParaRPr lang="en-US"/>
           </a:p>
@@ -1908,7 +2017,7 @@
           <a:p>
             <a:fld id="{6979B424-ED28-4BEC-8A28-BF427314F3CE}" type="datetimeFigureOut">
               <a:rPr lang="en-US" smtClean="0"/>
-              <a:t>1/31/2025</a:t>
+              <a:t>2/10/2025</a:t>
             </a:fld>
             <a:endParaRPr lang="en-US"/>
           </a:p>
@@ -2275,7 +2384,7 @@
           <a:p>
             <a:fld id="{6979B424-ED28-4BEC-8A28-BF427314F3CE}" type="datetimeFigureOut">
               <a:rPr lang="en-US" smtClean="0"/>
-              <a:t>1/31/2025</a:t>
+              <a:t>2/10/2025</a:t>
             </a:fld>
             <a:endParaRPr lang="en-US"/>
           </a:p>
@@ -2393,7 +2502,7 @@
           <a:p>
             <a:fld id="{6979B424-ED28-4BEC-8A28-BF427314F3CE}" type="datetimeFigureOut">
               <a:rPr lang="en-US" smtClean="0"/>
-              <a:t>1/31/2025</a:t>
+              <a:t>2/10/2025</a:t>
             </a:fld>
             <a:endParaRPr lang="en-US"/>
           </a:p>
@@ -2488,7 +2597,7 @@
           <a:p>
             <a:fld id="{6979B424-ED28-4BEC-8A28-BF427314F3CE}" type="datetimeFigureOut">
               <a:rPr lang="en-US" smtClean="0"/>
-              <a:t>1/31/2025</a:t>
+              <a:t>2/10/2025</a:t>
             </a:fld>
             <a:endParaRPr lang="en-US"/>
           </a:p>
@@ -2765,7 +2874,7 @@
           <a:p>
             <a:fld id="{6979B424-ED28-4BEC-8A28-BF427314F3CE}" type="datetimeFigureOut">
               <a:rPr lang="en-US" smtClean="0"/>
-              <a:t>1/31/2025</a:t>
+              <a:t>2/10/2025</a:t>
             </a:fld>
             <a:endParaRPr lang="en-US"/>
           </a:p>
@@ -3022,7 +3131,7 @@
           <a:p>
             <a:fld id="{6979B424-ED28-4BEC-8A28-BF427314F3CE}" type="datetimeFigureOut">
               <a:rPr lang="en-US" smtClean="0"/>
-              <a:t>1/31/2025</a:t>
+              <a:t>2/10/2025</a:t>
             </a:fld>
             <a:endParaRPr lang="en-US"/>
           </a:p>
@@ -3235,7 +3344,7 @@
           <a:p>
             <a:fld id="{6979B424-ED28-4BEC-8A28-BF427314F3CE}" type="datetimeFigureOut">
               <a:rPr lang="en-US" smtClean="0"/>
-              <a:t>1/31/2025</a:t>
+              <a:t>2/10/2025</a:t>
             </a:fld>
             <a:endParaRPr lang="en-US"/>
           </a:p>
@@ -3962,6 +4071,745 @@
   <p:cSld>
     <p:spTree>
       <p:nvGrpSpPr>
+        <p:cNvPr id="1" name="">
+          <a:extLst>
+            <a:ext uri="{FF2B5EF4-FFF2-40B4-BE49-F238E27FC236}">
+              <a16:creationId xmlns:a16="http://schemas.microsoft.com/office/drawing/2014/main" id="{FE0A495C-D8DF-E8FB-51F5-F38E77BDE56A}"/>
+            </a:ext>
+          </a:extLst>
+        </p:cNvPr>
+        <p:cNvGrpSpPr/>
+        <p:nvPr/>
+      </p:nvGrpSpPr>
+      <p:grpSpPr>
+        <a:xfrm>
+          <a:off x="0" y="0"/>
+          <a:ext cx="0" cy="0"/>
+          <a:chOff x="0" y="0"/>
+          <a:chExt cx="0" cy="0"/>
+        </a:xfrm>
+      </p:grpSpPr>
+      <p:sp>
+        <p:nvSpPr>
+          <p:cNvPr id="6" name="Rectangle 5">
+            <a:extLst>
+              <a:ext uri="{FF2B5EF4-FFF2-40B4-BE49-F238E27FC236}">
+                <a16:creationId xmlns:a16="http://schemas.microsoft.com/office/drawing/2014/main" id="{35B2A04D-6701-499E-8FCC-056B15377F87}"/>
+              </a:ext>
+            </a:extLst>
+          </p:cNvPr>
+          <p:cNvSpPr/>
+          <p:nvPr/>
+        </p:nvSpPr>
+        <p:spPr>
+          <a:xfrm>
+            <a:off x="0" y="0"/>
+            <a:ext cx="18288000" cy="711200"/>
+          </a:xfrm>
+          <a:prstGeom prst="rect">
+            <a:avLst/>
+          </a:prstGeom>
+          <a:solidFill>
+            <a:schemeClr val="accent5">
+              <a:lumMod val="60000"/>
+              <a:lumOff val="40000"/>
+            </a:schemeClr>
+          </a:solidFill>
+          <a:ln>
+            <a:noFill/>
+          </a:ln>
+        </p:spPr>
+        <p:style>
+          <a:lnRef idx="2">
+            <a:schemeClr val="accent1">
+              <a:shade val="15000"/>
+            </a:schemeClr>
+          </a:lnRef>
+          <a:fillRef idx="1">
+            <a:schemeClr val="accent1"/>
+          </a:fillRef>
+          <a:effectRef idx="0">
+            <a:schemeClr val="accent1"/>
+          </a:effectRef>
+          <a:fontRef idx="minor">
+            <a:schemeClr val="lt1"/>
+          </a:fontRef>
+        </p:style>
+        <p:txBody>
+          <a:bodyPr rtlCol="0" anchor="ctr"/>
+          <a:lstStyle/>
+          <a:p>
+            <a:pPr algn="ctr"/>
+            <a:endParaRPr lang="en-US"/>
+          </a:p>
+        </p:txBody>
+      </p:sp>
+      <p:sp>
+        <p:nvSpPr>
+          <p:cNvPr id="7" name="Rectangle 6">
+            <a:extLst>
+              <a:ext uri="{FF2B5EF4-FFF2-40B4-BE49-F238E27FC236}">
+                <a16:creationId xmlns:a16="http://schemas.microsoft.com/office/drawing/2014/main" id="{A2CBF9AA-FEB0-2744-4919-98B1C5171F99}"/>
+              </a:ext>
+            </a:extLst>
+          </p:cNvPr>
+          <p:cNvSpPr/>
+          <p:nvPr/>
+        </p:nvSpPr>
+        <p:spPr>
+          <a:xfrm>
+            <a:off x="0" y="711200"/>
+            <a:ext cx="18288000" cy="431800"/>
+          </a:xfrm>
+          <a:prstGeom prst="rect">
+            <a:avLst/>
+          </a:prstGeom>
+          <a:solidFill>
+            <a:schemeClr val="accent5">
+              <a:lumMod val="20000"/>
+              <a:lumOff val="80000"/>
+            </a:schemeClr>
+          </a:solidFill>
+          <a:ln>
+            <a:noFill/>
+          </a:ln>
+        </p:spPr>
+        <p:style>
+          <a:lnRef idx="2">
+            <a:schemeClr val="accent1">
+              <a:shade val="15000"/>
+            </a:schemeClr>
+          </a:lnRef>
+          <a:fillRef idx="1">
+            <a:schemeClr val="accent1"/>
+          </a:fillRef>
+          <a:effectRef idx="0">
+            <a:schemeClr val="accent1"/>
+          </a:effectRef>
+          <a:fontRef idx="minor">
+            <a:schemeClr val="lt1"/>
+          </a:fontRef>
+        </p:style>
+        <p:txBody>
+          <a:bodyPr rtlCol="0" anchor="ctr"/>
+          <a:lstStyle/>
+          <a:p>
+            <a:pPr algn="ctr"/>
+            <a:endParaRPr lang="en-US"/>
+          </a:p>
+        </p:txBody>
+      </p:sp>
+      <p:sp>
+        <p:nvSpPr>
+          <p:cNvPr id="8" name="Rectangle 7">
+            <a:extLst>
+              <a:ext uri="{FF2B5EF4-FFF2-40B4-BE49-F238E27FC236}">
+                <a16:creationId xmlns:a16="http://schemas.microsoft.com/office/drawing/2014/main" id="{D1AD5C93-16DA-4DC8-FBE3-2076E3C29F18}"/>
+              </a:ext>
+            </a:extLst>
+          </p:cNvPr>
+          <p:cNvSpPr/>
+          <p:nvPr/>
+        </p:nvSpPr>
+        <p:spPr>
+          <a:xfrm>
+            <a:off x="0" y="1143000"/>
+            <a:ext cx="18288000" cy="431800"/>
+          </a:xfrm>
+          <a:prstGeom prst="rect">
+            <a:avLst/>
+          </a:prstGeom>
+          <a:solidFill>
+            <a:schemeClr val="bg1"/>
+          </a:solidFill>
+          <a:ln>
+            <a:noFill/>
+          </a:ln>
+          <a:effectLst>
+            <a:outerShdw blurRad="50800" dist="38100" dir="5400000" algn="t" rotWithShape="0">
+              <a:prstClr val="black">
+                <a:alpha val="40000"/>
+              </a:prstClr>
+            </a:outerShdw>
+          </a:effectLst>
+        </p:spPr>
+        <p:style>
+          <a:lnRef idx="2">
+            <a:schemeClr val="accent1">
+              <a:shade val="15000"/>
+            </a:schemeClr>
+          </a:lnRef>
+          <a:fillRef idx="1">
+            <a:schemeClr val="accent1"/>
+          </a:fillRef>
+          <a:effectRef idx="0">
+            <a:schemeClr val="accent1"/>
+          </a:effectRef>
+          <a:fontRef idx="minor">
+            <a:schemeClr val="lt1"/>
+          </a:fontRef>
+        </p:style>
+        <p:txBody>
+          <a:bodyPr rtlCol="0" anchor="ctr"/>
+          <a:lstStyle/>
+          <a:p>
+            <a:pPr algn="ctr"/>
+            <a:endParaRPr lang="en-US"/>
+          </a:p>
+        </p:txBody>
+      </p:sp>
+      <p:sp>
+        <p:nvSpPr>
+          <p:cNvPr id="9" name="Rectangle: Rounded Corners 8">
+            <a:extLst>
+              <a:ext uri="{FF2B5EF4-FFF2-40B4-BE49-F238E27FC236}">
+                <a16:creationId xmlns:a16="http://schemas.microsoft.com/office/drawing/2014/main" id="{4D3E62C9-966B-7AE2-2AD8-A9DF1548F84B}"/>
+              </a:ext>
+            </a:extLst>
+          </p:cNvPr>
+          <p:cNvSpPr/>
+          <p:nvPr/>
+        </p:nvSpPr>
+        <p:spPr>
+          <a:xfrm>
+            <a:off x="211016" y="2148397"/>
+            <a:ext cx="17865965" cy="4109772"/>
+          </a:xfrm>
+          <a:prstGeom prst="roundRect">
+            <a:avLst>
+              <a:gd name="adj" fmla="val 2886"/>
+            </a:avLst>
+          </a:prstGeom>
+          <a:solidFill>
+            <a:schemeClr val="bg1">
+              <a:lumMod val="95000"/>
+            </a:schemeClr>
+          </a:solidFill>
+          <a:ln>
+            <a:noFill/>
+          </a:ln>
+          <a:effectLst>
+            <a:innerShdw blurRad="114300">
+              <a:prstClr val="black"/>
+            </a:innerShdw>
+          </a:effectLst>
+        </p:spPr>
+        <p:style>
+          <a:lnRef idx="2">
+            <a:schemeClr val="accent1">
+              <a:shade val="15000"/>
+            </a:schemeClr>
+          </a:lnRef>
+          <a:fillRef idx="1">
+            <a:schemeClr val="accent1"/>
+          </a:fillRef>
+          <a:effectRef idx="0">
+            <a:schemeClr val="accent1"/>
+          </a:effectRef>
+          <a:fontRef idx="minor">
+            <a:schemeClr val="lt1"/>
+          </a:fontRef>
+        </p:style>
+        <p:txBody>
+          <a:bodyPr rtlCol="0" anchor="ctr"/>
+          <a:lstStyle/>
+          <a:p>
+            <a:pPr algn="ctr"/>
+            <a:endParaRPr lang="en-US"/>
+          </a:p>
+        </p:txBody>
+      </p:sp>
+      <p:sp>
+        <p:nvSpPr>
+          <p:cNvPr id="11" name="Rectangle: Rounded Corners 10">
+            <a:extLst>
+              <a:ext uri="{FF2B5EF4-FFF2-40B4-BE49-F238E27FC236}">
+                <a16:creationId xmlns:a16="http://schemas.microsoft.com/office/drawing/2014/main" id="{AB081821-CD1B-4450-8697-FBA06AC89DAE}"/>
+              </a:ext>
+            </a:extLst>
+          </p:cNvPr>
+          <p:cNvSpPr/>
+          <p:nvPr/>
+        </p:nvSpPr>
+        <p:spPr>
+          <a:xfrm>
+            <a:off x="211016" y="6853077"/>
+            <a:ext cx="17865965" cy="3326463"/>
+          </a:xfrm>
+          <a:prstGeom prst="roundRect">
+            <a:avLst>
+              <a:gd name="adj" fmla="val 2449"/>
+            </a:avLst>
+          </a:prstGeom>
+          <a:solidFill>
+            <a:schemeClr val="bg1">
+              <a:lumMod val="95000"/>
+            </a:schemeClr>
+          </a:solidFill>
+          <a:ln>
+            <a:noFill/>
+          </a:ln>
+          <a:effectLst>
+            <a:innerShdw blurRad="114300">
+              <a:prstClr val="black"/>
+            </a:innerShdw>
+          </a:effectLst>
+        </p:spPr>
+        <p:style>
+          <a:lnRef idx="2">
+            <a:schemeClr val="accent1">
+              <a:shade val="15000"/>
+            </a:schemeClr>
+          </a:lnRef>
+          <a:fillRef idx="1">
+            <a:schemeClr val="accent1"/>
+          </a:fillRef>
+          <a:effectRef idx="0">
+            <a:schemeClr val="accent1"/>
+          </a:effectRef>
+          <a:fontRef idx="minor">
+            <a:schemeClr val="lt1"/>
+          </a:fontRef>
+        </p:style>
+        <p:txBody>
+          <a:bodyPr rtlCol="0" anchor="ctr"/>
+          <a:lstStyle/>
+          <a:p>
+            <a:pPr algn="ctr"/>
+            <a:endParaRPr lang="en-US"/>
+          </a:p>
+        </p:txBody>
+      </p:sp>
+      <p:sp>
+        <p:nvSpPr>
+          <p:cNvPr id="12" name="TextBox 11">
+            <a:extLst>
+              <a:ext uri="{FF2B5EF4-FFF2-40B4-BE49-F238E27FC236}">
+                <a16:creationId xmlns:a16="http://schemas.microsoft.com/office/drawing/2014/main" id="{35FA4B46-E659-0D68-0924-E8141515CD86}"/>
+              </a:ext>
+            </a:extLst>
+          </p:cNvPr>
+          <p:cNvSpPr txBox="1"/>
+          <p:nvPr/>
+        </p:nvSpPr>
+        <p:spPr>
+          <a:xfrm>
+            <a:off x="478005" y="1676933"/>
+            <a:ext cx="2384755" cy="369332"/>
+          </a:xfrm>
+          <a:prstGeom prst="rect">
+            <a:avLst/>
+          </a:prstGeom>
+          <a:noFill/>
+        </p:spPr>
+        <p:txBody>
+          <a:bodyPr wrap="none" rtlCol="0">
+            <a:spAutoFit/>
+          </a:bodyPr>
+          <a:lstStyle/>
+          <a:p>
+            <a:r>
+              <a:rPr lang="en-US" b="1" dirty="0">
+                <a:solidFill>
+                  <a:schemeClr val="bg2">
+                    <a:lumMod val="25000"/>
+                  </a:schemeClr>
+                </a:solidFill>
+              </a:rPr>
+              <a:t>Hires &amp; Attrition Rate</a:t>
+            </a:r>
+          </a:p>
+        </p:txBody>
+      </p:sp>
+      <p:pic>
+        <p:nvPicPr>
+          <p:cNvPr id="15" name="Picture 14" descr="A blue and black logo&#10;&#10;Description automatically generated">
+            <a:extLst>
+              <a:ext uri="{FF2B5EF4-FFF2-40B4-BE49-F238E27FC236}">
+                <a16:creationId xmlns:a16="http://schemas.microsoft.com/office/drawing/2014/main" id="{DBAF6F90-957F-7601-50CD-6C4CBABEC7BB}"/>
+              </a:ext>
+            </a:extLst>
+          </p:cNvPr>
+          <p:cNvPicPr preferRelativeResize="0">
+            <a:picLocks noChangeAspect="1"/>
+          </p:cNvPicPr>
+          <p:nvPr/>
+        </p:nvPicPr>
+        <p:blipFill>
+          <a:blip r:embed="rId3" cstate="print">
+            <a:extLst>
+              <a:ext uri="{28A0092B-C50C-407E-A947-70E740481C1C}">
+                <a14:useLocalDpi xmlns:a14="http://schemas.microsoft.com/office/drawing/2010/main" val="0"/>
+              </a:ext>
+            </a:extLst>
+          </a:blip>
+          <a:srcRect l="27137" t="16710" r="25806" b="43169"/>
+          <a:stretch/>
+        </p:blipFill>
+        <p:spPr>
+          <a:xfrm>
+            <a:off x="111949" y="-34240"/>
+            <a:ext cx="732113" cy="732113"/>
+          </a:xfrm>
+          <a:prstGeom prst="rect">
+            <a:avLst/>
+          </a:prstGeom>
+        </p:spPr>
+      </p:pic>
+      <p:sp>
+        <p:nvSpPr>
+          <p:cNvPr id="16" name="TextBox 15">
+            <a:extLst>
+              <a:ext uri="{FF2B5EF4-FFF2-40B4-BE49-F238E27FC236}">
+                <a16:creationId xmlns:a16="http://schemas.microsoft.com/office/drawing/2014/main" id="{9DB7C22F-CC1A-0C38-2048-C4DA5DB83148}"/>
+              </a:ext>
+            </a:extLst>
+          </p:cNvPr>
+          <p:cNvSpPr txBox="1"/>
+          <p:nvPr/>
+        </p:nvSpPr>
+        <p:spPr>
+          <a:xfrm>
+            <a:off x="815332" y="-22127"/>
+            <a:ext cx="5096267" cy="707886"/>
+          </a:xfrm>
+          <a:prstGeom prst="rect">
+            <a:avLst/>
+          </a:prstGeom>
+          <a:noFill/>
+        </p:spPr>
+        <p:txBody>
+          <a:bodyPr wrap="none" rtlCol="0">
+            <a:spAutoFit/>
+          </a:bodyPr>
+          <a:lstStyle/>
+          <a:p>
+            <a:r>
+              <a:rPr lang="en-US" sz="4000" b="1" dirty="0" err="1">
+                <a:solidFill>
+                  <a:schemeClr val="bg1"/>
+                </a:solidFill>
+                <a:latin typeface="Bahnschrift SemiBold SemiConden" panose="020B0502040204020203" pitchFamily="34" charset="0"/>
+              </a:rPr>
+              <a:t>TechCore</a:t>
+            </a:r>
+            <a:r>
+              <a:rPr lang="en-US" sz="4000" b="1" dirty="0">
+                <a:solidFill>
+                  <a:schemeClr val="bg1"/>
+                </a:solidFill>
+                <a:latin typeface="Bahnschrift SemiBold SemiConden" panose="020B0502040204020203" pitchFamily="34" charset="0"/>
+              </a:rPr>
+              <a:t> Innovation- HR</a:t>
+            </a:r>
+          </a:p>
+        </p:txBody>
+      </p:sp>
+      <p:sp>
+        <p:nvSpPr>
+          <p:cNvPr id="19" name="TextBox 18">
+            <a:extLst>
+              <a:ext uri="{FF2B5EF4-FFF2-40B4-BE49-F238E27FC236}">
+                <a16:creationId xmlns:a16="http://schemas.microsoft.com/office/drawing/2014/main" id="{6CC7FEF1-8D79-9896-B306-A76734991DBD}"/>
+              </a:ext>
+            </a:extLst>
+          </p:cNvPr>
+          <p:cNvSpPr txBox="1"/>
+          <p:nvPr/>
+        </p:nvSpPr>
+        <p:spPr>
+          <a:xfrm>
+            <a:off x="478005" y="6370957"/>
+            <a:ext cx="2441117" cy="369332"/>
+          </a:xfrm>
+          <a:prstGeom prst="rect">
+            <a:avLst/>
+          </a:prstGeom>
+          <a:noFill/>
+        </p:spPr>
+        <p:txBody>
+          <a:bodyPr wrap="none" rtlCol="0">
+            <a:spAutoFit/>
+          </a:bodyPr>
+          <a:lstStyle/>
+          <a:p>
+            <a:r>
+              <a:rPr lang="en-US" b="1" dirty="0">
+                <a:solidFill>
+                  <a:schemeClr val="bg2">
+                    <a:lumMod val="25000"/>
+                  </a:schemeClr>
+                </a:solidFill>
+              </a:rPr>
+              <a:t>Avg Age vs Avg Tenure</a:t>
+            </a:r>
+          </a:p>
+        </p:txBody>
+      </p:sp>
+      <p:sp>
+        <p:nvSpPr>
+          <p:cNvPr id="5" name="TextBox 4">
+            <a:extLst>
+              <a:ext uri="{FF2B5EF4-FFF2-40B4-BE49-F238E27FC236}">
+                <a16:creationId xmlns:a16="http://schemas.microsoft.com/office/drawing/2014/main" id="{057FC1B5-FA65-4343-E6DC-D750EA56B0B0}"/>
+              </a:ext>
+            </a:extLst>
+          </p:cNvPr>
+          <p:cNvSpPr txBox="1"/>
+          <p:nvPr/>
+        </p:nvSpPr>
+        <p:spPr>
+          <a:xfrm>
+            <a:off x="5913174" y="1676933"/>
+            <a:ext cx="4003147" cy="369332"/>
+          </a:xfrm>
+          <a:prstGeom prst="rect">
+            <a:avLst/>
+          </a:prstGeom>
+          <a:noFill/>
+        </p:spPr>
+        <p:txBody>
+          <a:bodyPr wrap="none" rtlCol="0">
+            <a:spAutoFit/>
+          </a:bodyPr>
+          <a:lstStyle/>
+          <a:p>
+            <a:r>
+              <a:rPr lang="en-US" b="1" dirty="0">
+                <a:solidFill>
+                  <a:schemeClr val="bg2">
+                    <a:lumMod val="25000"/>
+                  </a:schemeClr>
+                </a:solidFill>
+              </a:rPr>
+              <a:t>Proportion of Employee by Org Level </a:t>
+            </a:r>
+          </a:p>
+        </p:txBody>
+      </p:sp>
+      <p:sp>
+        <p:nvSpPr>
+          <p:cNvPr id="13" name="TextBox 12">
+            <a:extLst>
+              <a:ext uri="{FF2B5EF4-FFF2-40B4-BE49-F238E27FC236}">
+                <a16:creationId xmlns:a16="http://schemas.microsoft.com/office/drawing/2014/main" id="{46B25BB3-95A9-B0BD-BC81-6B97FBCA2D0B}"/>
+              </a:ext>
+            </a:extLst>
+          </p:cNvPr>
+          <p:cNvSpPr txBox="1"/>
+          <p:nvPr/>
+        </p:nvSpPr>
+        <p:spPr>
+          <a:xfrm>
+            <a:off x="5911599" y="6370957"/>
+            <a:ext cx="2664319" cy="369332"/>
+          </a:xfrm>
+          <a:prstGeom prst="rect">
+            <a:avLst/>
+          </a:prstGeom>
+          <a:noFill/>
+        </p:spPr>
+        <p:txBody>
+          <a:bodyPr wrap="none" rtlCol="0">
+            <a:spAutoFit/>
+          </a:bodyPr>
+          <a:lstStyle/>
+          <a:p>
+            <a:r>
+              <a:rPr lang="en-US" b="1" dirty="0">
+                <a:solidFill>
+                  <a:schemeClr val="bg2">
+                    <a:lumMod val="25000"/>
+                  </a:schemeClr>
+                </a:solidFill>
+              </a:rPr>
+              <a:t>Headcount by Org Level</a:t>
+            </a:r>
+          </a:p>
+        </p:txBody>
+      </p:sp>
+      <p:sp>
+        <p:nvSpPr>
+          <p:cNvPr id="24" name="TextBox 23">
+            <a:extLst>
+              <a:ext uri="{FF2B5EF4-FFF2-40B4-BE49-F238E27FC236}">
+                <a16:creationId xmlns:a16="http://schemas.microsoft.com/office/drawing/2014/main" id="{A05529E0-4063-2D67-C93C-ABB66BB88B62}"/>
+              </a:ext>
+            </a:extLst>
+          </p:cNvPr>
+          <p:cNvSpPr txBox="1"/>
+          <p:nvPr/>
+        </p:nvSpPr>
+        <p:spPr>
+          <a:xfrm>
+            <a:off x="602855" y="1181422"/>
+            <a:ext cx="643061" cy="369332"/>
+          </a:xfrm>
+          <a:prstGeom prst="rect">
+            <a:avLst/>
+          </a:prstGeom>
+          <a:noFill/>
+        </p:spPr>
+        <p:txBody>
+          <a:bodyPr wrap="none" rtlCol="0">
+            <a:spAutoFit/>
+          </a:bodyPr>
+          <a:lstStyle/>
+          <a:p>
+            <a:r>
+              <a:rPr lang="en-US" b="1" dirty="0">
+                <a:solidFill>
+                  <a:schemeClr val="bg2">
+                    <a:lumMod val="25000"/>
+                  </a:schemeClr>
+                </a:solidFill>
+              </a:rPr>
+              <a:t>Year</a:t>
+            </a:r>
+          </a:p>
+        </p:txBody>
+      </p:sp>
+      <p:sp>
+        <p:nvSpPr>
+          <p:cNvPr id="25" name="TextBox 24">
+            <a:extLst>
+              <a:ext uri="{FF2B5EF4-FFF2-40B4-BE49-F238E27FC236}">
+                <a16:creationId xmlns:a16="http://schemas.microsoft.com/office/drawing/2014/main" id="{4F05A8A8-DCBD-DC78-80FD-829753297B1F}"/>
+              </a:ext>
+            </a:extLst>
+          </p:cNvPr>
+          <p:cNvSpPr txBox="1"/>
+          <p:nvPr/>
+        </p:nvSpPr>
+        <p:spPr>
+          <a:xfrm>
+            <a:off x="2720404" y="1181422"/>
+            <a:ext cx="854721" cy="369332"/>
+          </a:xfrm>
+          <a:prstGeom prst="rect">
+            <a:avLst/>
+          </a:prstGeom>
+          <a:noFill/>
+        </p:spPr>
+        <p:txBody>
+          <a:bodyPr wrap="none" rtlCol="0">
+            <a:spAutoFit/>
+          </a:bodyPr>
+          <a:lstStyle/>
+          <a:p>
+            <a:r>
+              <a:rPr lang="en-US" b="1" dirty="0">
+                <a:solidFill>
+                  <a:schemeClr val="bg2">
+                    <a:lumMod val="25000"/>
+                  </a:schemeClr>
+                </a:solidFill>
+              </a:rPr>
+              <a:t>Month</a:t>
+            </a:r>
+          </a:p>
+        </p:txBody>
+      </p:sp>
+      <p:sp>
+        <p:nvSpPr>
+          <p:cNvPr id="26" name="TextBox 25">
+            <a:extLst>
+              <a:ext uri="{FF2B5EF4-FFF2-40B4-BE49-F238E27FC236}">
+                <a16:creationId xmlns:a16="http://schemas.microsoft.com/office/drawing/2014/main" id="{DB66B28D-035C-922D-FAA4-372F68603FD2}"/>
+              </a:ext>
+            </a:extLst>
+          </p:cNvPr>
+          <p:cNvSpPr txBox="1"/>
+          <p:nvPr/>
+        </p:nvSpPr>
+        <p:spPr>
+          <a:xfrm>
+            <a:off x="5484238" y="1181422"/>
+            <a:ext cx="1452642" cy="369332"/>
+          </a:xfrm>
+          <a:prstGeom prst="rect">
+            <a:avLst/>
+          </a:prstGeom>
+          <a:noFill/>
+        </p:spPr>
+        <p:txBody>
+          <a:bodyPr wrap="none" rtlCol="0">
+            <a:spAutoFit/>
+          </a:bodyPr>
+          <a:lstStyle/>
+          <a:p>
+            <a:r>
+              <a:rPr lang="en-US" b="1" dirty="0">
+                <a:solidFill>
+                  <a:schemeClr val="bg2">
+                    <a:lumMod val="25000"/>
+                  </a:schemeClr>
+                </a:solidFill>
+              </a:rPr>
+              <a:t>Department</a:t>
+            </a:r>
+          </a:p>
+        </p:txBody>
+      </p:sp>
+      <p:sp>
+        <p:nvSpPr>
+          <p:cNvPr id="2" name="TextBox 1">
+            <a:extLst>
+              <a:ext uri="{FF2B5EF4-FFF2-40B4-BE49-F238E27FC236}">
+                <a16:creationId xmlns:a16="http://schemas.microsoft.com/office/drawing/2014/main" id="{7A0AC530-6EE5-FCF2-9099-0C37D785E44C}"/>
+              </a:ext>
+            </a:extLst>
+          </p:cNvPr>
+          <p:cNvSpPr txBox="1"/>
+          <p:nvPr/>
+        </p:nvSpPr>
+        <p:spPr>
+          <a:xfrm>
+            <a:off x="12197877" y="1676933"/>
+            <a:ext cx="4419608" cy="369332"/>
+          </a:xfrm>
+          <a:prstGeom prst="rect">
+            <a:avLst/>
+          </a:prstGeom>
+          <a:noFill/>
+        </p:spPr>
+        <p:txBody>
+          <a:bodyPr wrap="none" rtlCol="0">
+            <a:spAutoFit/>
+          </a:bodyPr>
+          <a:lstStyle/>
+          <a:p>
+            <a:r>
+              <a:rPr lang="en-US" b="1" dirty="0">
+                <a:solidFill>
+                  <a:schemeClr val="bg2">
+                    <a:lumMod val="25000"/>
+                  </a:schemeClr>
+                </a:solidFill>
+              </a:rPr>
+              <a:t>Headcount by Org Level and Department</a:t>
+            </a:r>
+          </a:p>
+        </p:txBody>
+      </p:sp>
+    </p:spTree>
+    <p:extLst>
+      <p:ext uri="{BB962C8B-B14F-4D97-AF65-F5344CB8AC3E}">
+        <p14:creationId xmlns:p14="http://schemas.microsoft.com/office/powerpoint/2010/main" val="3380541984"/>
+      </p:ext>
+    </p:extLst>
+  </p:cSld>
+  <p:clrMapOvr>
+    <a:masterClrMapping/>
+  </p:clrMapOvr>
+</p:sld>
+</file>
+
+<file path=ppt/slides/slide11.xml><?xml version="1.0" encoding="utf-8"?>
+<p:sld xmlns:a="http://schemas.openxmlformats.org/drawingml/2006/main" xmlns:r="http://schemas.openxmlformats.org/officeDocument/2006/relationships" xmlns:p="http://schemas.openxmlformats.org/presentationml/2006/main">
+  <p:cSld>
+    <p:spTree>
+      <p:nvGrpSpPr>
         <p:cNvPr id="1" name=""/>
         <p:cNvGrpSpPr/>
         <p:nvPr/>
@@ -4069,7 +4917,7 @@
 </p:sld>
 </file>
 
-<file path=ppt/slides/slide11.xml><?xml version="1.0" encoding="utf-8"?>
+<file path=ppt/slides/slide12.xml><?xml version="1.0" encoding="utf-8"?>
 <p:sld xmlns:a="http://schemas.openxmlformats.org/drawingml/2006/main" xmlns:r="http://schemas.openxmlformats.org/officeDocument/2006/relationships" xmlns:p="http://schemas.openxmlformats.org/presentationml/2006/main">
   <p:cSld>
     <p:bg>
@@ -4735,7 +5583,7 @@
 </p:sld>
 </file>
 
-<file path=ppt/slides/slide12.xml><?xml version="1.0" encoding="utf-8"?>
+<file path=ppt/slides/slide13.xml><?xml version="1.0" encoding="utf-8"?>
 <p:sld xmlns:a="http://schemas.openxmlformats.org/drawingml/2006/main" xmlns:r="http://schemas.openxmlformats.org/officeDocument/2006/relationships" xmlns:p="http://schemas.openxmlformats.org/presentationml/2006/main">
   <p:cSld>
     <p:bg>
@@ -5458,7 +6306,7 @@
 </p:sld>
 </file>
 
-<file path=ppt/slides/slide13.xml><?xml version="1.0" encoding="utf-8"?>
+<file path=ppt/slides/slide14.xml><?xml version="1.0" encoding="utf-8"?>
 <p:sld xmlns:a="http://schemas.openxmlformats.org/drawingml/2006/main" xmlns:r="http://schemas.openxmlformats.org/officeDocument/2006/relationships" xmlns:p="http://schemas.openxmlformats.org/presentationml/2006/main">
   <p:cSld>
     <p:bg>
@@ -6267,1095 +7115,6 @@
 </p:sld>
 </file>
 
-<file path=ppt/slides/slide14.xml><?xml version="1.0" encoding="utf-8"?>
-<p:sld xmlns:a="http://schemas.openxmlformats.org/drawingml/2006/main" xmlns:r="http://schemas.openxmlformats.org/officeDocument/2006/relationships" xmlns:p="http://schemas.openxmlformats.org/presentationml/2006/main">
-  <p:cSld>
-    <p:spTree>
-      <p:nvGrpSpPr>
-        <p:cNvPr id="1" name="">
-          <a:extLst>
-            <a:ext uri="{FF2B5EF4-FFF2-40B4-BE49-F238E27FC236}">
-              <a16:creationId xmlns:a16="http://schemas.microsoft.com/office/drawing/2014/main" id="{04AEC289-3B22-0D11-6E42-2F521D8C61CF}"/>
-            </a:ext>
-          </a:extLst>
-        </p:cNvPr>
-        <p:cNvGrpSpPr/>
-        <p:nvPr/>
-      </p:nvGrpSpPr>
-      <p:grpSpPr>
-        <a:xfrm>
-          <a:off x="0" y="0"/>
-          <a:ext cx="0" cy="0"/>
-          <a:chOff x="0" y="0"/>
-          <a:chExt cx="0" cy="0"/>
-        </a:xfrm>
-      </p:grpSpPr>
-      <p:sp>
-        <p:nvSpPr>
-          <p:cNvPr id="6" name="Rectangle 5">
-            <a:extLst>
-              <a:ext uri="{FF2B5EF4-FFF2-40B4-BE49-F238E27FC236}">
-                <a16:creationId xmlns:a16="http://schemas.microsoft.com/office/drawing/2014/main" id="{99658B2A-B5B8-C148-9715-B5BF2FFF5095}"/>
-              </a:ext>
-            </a:extLst>
-          </p:cNvPr>
-          <p:cNvSpPr/>
-          <p:nvPr/>
-        </p:nvSpPr>
-        <p:spPr>
-          <a:xfrm>
-            <a:off x="0" y="0"/>
-            <a:ext cx="18288000" cy="711200"/>
-          </a:xfrm>
-          <a:prstGeom prst="rect">
-            <a:avLst/>
-          </a:prstGeom>
-          <a:solidFill>
-            <a:schemeClr val="accent5">
-              <a:lumMod val="60000"/>
-              <a:lumOff val="40000"/>
-            </a:schemeClr>
-          </a:solidFill>
-          <a:ln>
-            <a:noFill/>
-          </a:ln>
-        </p:spPr>
-        <p:style>
-          <a:lnRef idx="2">
-            <a:schemeClr val="accent1">
-              <a:shade val="15000"/>
-            </a:schemeClr>
-          </a:lnRef>
-          <a:fillRef idx="1">
-            <a:schemeClr val="accent1"/>
-          </a:fillRef>
-          <a:effectRef idx="0">
-            <a:schemeClr val="accent1"/>
-          </a:effectRef>
-          <a:fontRef idx="minor">
-            <a:schemeClr val="lt1"/>
-          </a:fontRef>
-        </p:style>
-        <p:txBody>
-          <a:bodyPr rtlCol="0" anchor="ctr"/>
-          <a:lstStyle/>
-          <a:p>
-            <a:pPr algn="ctr"/>
-            <a:endParaRPr lang="en-US"/>
-          </a:p>
-        </p:txBody>
-      </p:sp>
-      <p:sp>
-        <p:nvSpPr>
-          <p:cNvPr id="7" name="Rectangle 6">
-            <a:extLst>
-              <a:ext uri="{FF2B5EF4-FFF2-40B4-BE49-F238E27FC236}">
-                <a16:creationId xmlns:a16="http://schemas.microsoft.com/office/drawing/2014/main" id="{8CC0C682-3FA9-67A2-4147-2BFF3E5578B2}"/>
-              </a:ext>
-            </a:extLst>
-          </p:cNvPr>
-          <p:cNvSpPr/>
-          <p:nvPr/>
-        </p:nvSpPr>
-        <p:spPr>
-          <a:xfrm>
-            <a:off x="0" y="711200"/>
-            <a:ext cx="18288000" cy="431800"/>
-          </a:xfrm>
-          <a:prstGeom prst="rect">
-            <a:avLst/>
-          </a:prstGeom>
-          <a:solidFill>
-            <a:schemeClr val="accent5">
-              <a:lumMod val="20000"/>
-              <a:lumOff val="80000"/>
-            </a:schemeClr>
-          </a:solidFill>
-          <a:ln>
-            <a:noFill/>
-          </a:ln>
-        </p:spPr>
-        <p:style>
-          <a:lnRef idx="2">
-            <a:schemeClr val="accent1">
-              <a:shade val="15000"/>
-            </a:schemeClr>
-          </a:lnRef>
-          <a:fillRef idx="1">
-            <a:schemeClr val="accent1"/>
-          </a:fillRef>
-          <a:effectRef idx="0">
-            <a:schemeClr val="accent1"/>
-          </a:effectRef>
-          <a:fontRef idx="minor">
-            <a:schemeClr val="lt1"/>
-          </a:fontRef>
-        </p:style>
-        <p:txBody>
-          <a:bodyPr rtlCol="0" anchor="ctr"/>
-          <a:lstStyle/>
-          <a:p>
-            <a:pPr algn="ctr"/>
-            <a:endParaRPr lang="en-US"/>
-          </a:p>
-        </p:txBody>
-      </p:sp>
-      <p:sp>
-        <p:nvSpPr>
-          <p:cNvPr id="8" name="Rectangle 7">
-            <a:extLst>
-              <a:ext uri="{FF2B5EF4-FFF2-40B4-BE49-F238E27FC236}">
-                <a16:creationId xmlns:a16="http://schemas.microsoft.com/office/drawing/2014/main" id="{4BFAF3C6-CE9B-F106-3309-A0952EFEF307}"/>
-              </a:ext>
-            </a:extLst>
-          </p:cNvPr>
-          <p:cNvSpPr/>
-          <p:nvPr/>
-        </p:nvSpPr>
-        <p:spPr>
-          <a:xfrm>
-            <a:off x="0" y="1143000"/>
-            <a:ext cx="18288000" cy="431800"/>
-          </a:xfrm>
-          <a:prstGeom prst="rect">
-            <a:avLst/>
-          </a:prstGeom>
-          <a:solidFill>
-            <a:schemeClr val="bg1"/>
-          </a:solidFill>
-          <a:ln>
-            <a:noFill/>
-          </a:ln>
-          <a:effectLst>
-            <a:outerShdw blurRad="50800" dist="38100" dir="5400000" algn="t" rotWithShape="0">
-              <a:prstClr val="black">
-                <a:alpha val="40000"/>
-              </a:prstClr>
-            </a:outerShdw>
-          </a:effectLst>
-        </p:spPr>
-        <p:style>
-          <a:lnRef idx="2">
-            <a:schemeClr val="accent1">
-              <a:shade val="15000"/>
-            </a:schemeClr>
-          </a:lnRef>
-          <a:fillRef idx="1">
-            <a:schemeClr val="accent1"/>
-          </a:fillRef>
-          <a:effectRef idx="0">
-            <a:schemeClr val="accent1"/>
-          </a:effectRef>
-          <a:fontRef idx="minor">
-            <a:schemeClr val="lt1"/>
-          </a:fontRef>
-        </p:style>
-        <p:txBody>
-          <a:bodyPr rtlCol="0" anchor="ctr"/>
-          <a:lstStyle/>
-          <a:p>
-            <a:pPr algn="ctr"/>
-            <a:endParaRPr lang="en-US"/>
-          </a:p>
-        </p:txBody>
-      </p:sp>
-      <p:sp>
-        <p:nvSpPr>
-          <p:cNvPr id="9" name="Rectangle: Rounded Corners 8">
-            <a:extLst>
-              <a:ext uri="{FF2B5EF4-FFF2-40B4-BE49-F238E27FC236}">
-                <a16:creationId xmlns:a16="http://schemas.microsoft.com/office/drawing/2014/main" id="{C2F0E419-BD10-4CA8-A190-89C8DB86112F}"/>
-              </a:ext>
-            </a:extLst>
-          </p:cNvPr>
-          <p:cNvSpPr/>
-          <p:nvPr/>
-        </p:nvSpPr>
-        <p:spPr>
-          <a:xfrm>
-            <a:off x="108572" y="1757362"/>
-            <a:ext cx="6479352" cy="8422178"/>
-          </a:xfrm>
-          <a:prstGeom prst="roundRect">
-            <a:avLst>
-              <a:gd name="adj" fmla="val 7996"/>
-            </a:avLst>
-          </a:prstGeom>
-          <a:solidFill>
-            <a:schemeClr val="bg1">
-              <a:lumMod val="95000"/>
-            </a:schemeClr>
-          </a:solidFill>
-          <a:ln>
-            <a:noFill/>
-          </a:ln>
-          <a:effectLst>
-            <a:innerShdw blurRad="114300">
-              <a:prstClr val="black"/>
-            </a:innerShdw>
-          </a:effectLst>
-        </p:spPr>
-        <p:style>
-          <a:lnRef idx="2">
-            <a:schemeClr val="accent1">
-              <a:shade val="15000"/>
-            </a:schemeClr>
-          </a:lnRef>
-          <a:fillRef idx="1">
-            <a:schemeClr val="accent1"/>
-          </a:fillRef>
-          <a:effectRef idx="0">
-            <a:schemeClr val="accent1"/>
-          </a:effectRef>
-          <a:fontRef idx="minor">
-            <a:schemeClr val="lt1"/>
-          </a:fontRef>
-        </p:style>
-        <p:txBody>
-          <a:bodyPr rtlCol="0" anchor="ctr"/>
-          <a:lstStyle/>
-          <a:p>
-            <a:pPr algn="ctr"/>
-            <a:endParaRPr lang="en-US" dirty="0"/>
-          </a:p>
-        </p:txBody>
-      </p:sp>
-      <p:sp>
-        <p:nvSpPr>
-          <p:cNvPr id="11" name="Rectangle: Rounded Corners 10">
-            <a:extLst>
-              <a:ext uri="{FF2B5EF4-FFF2-40B4-BE49-F238E27FC236}">
-                <a16:creationId xmlns:a16="http://schemas.microsoft.com/office/drawing/2014/main" id="{4970FEA8-9661-D48F-439B-20E589BFB1E0}"/>
-              </a:ext>
-            </a:extLst>
-          </p:cNvPr>
-          <p:cNvSpPr/>
-          <p:nvPr/>
-        </p:nvSpPr>
-        <p:spPr>
-          <a:xfrm>
-            <a:off x="6829032" y="1854200"/>
-            <a:ext cx="6029718" cy="2278260"/>
-          </a:xfrm>
-          <a:prstGeom prst="roundRect">
-            <a:avLst>
-              <a:gd name="adj" fmla="val 7996"/>
-            </a:avLst>
-          </a:prstGeom>
-          <a:solidFill>
-            <a:schemeClr val="bg1">
-              <a:lumMod val="95000"/>
-            </a:schemeClr>
-          </a:solidFill>
-          <a:ln>
-            <a:noFill/>
-          </a:ln>
-          <a:effectLst>
-            <a:innerShdw blurRad="114300">
-              <a:prstClr val="black"/>
-            </a:innerShdw>
-          </a:effectLst>
-        </p:spPr>
-        <p:style>
-          <a:lnRef idx="2">
-            <a:schemeClr val="accent1">
-              <a:shade val="15000"/>
-            </a:schemeClr>
-          </a:lnRef>
-          <a:fillRef idx="1">
-            <a:schemeClr val="accent1"/>
-          </a:fillRef>
-          <a:effectRef idx="0">
-            <a:schemeClr val="accent1"/>
-          </a:effectRef>
-          <a:fontRef idx="minor">
-            <a:schemeClr val="lt1"/>
-          </a:fontRef>
-        </p:style>
-        <p:txBody>
-          <a:bodyPr rtlCol="0" anchor="ctr"/>
-          <a:lstStyle/>
-          <a:p>
-            <a:pPr algn="ctr"/>
-            <a:endParaRPr lang="en-US"/>
-          </a:p>
-        </p:txBody>
-      </p:sp>
-      <p:pic>
-        <p:nvPicPr>
-          <p:cNvPr id="15" name="Picture 14" descr="A blue and black logo&#10;&#10;Description automatically generated">
-            <a:extLst>
-              <a:ext uri="{FF2B5EF4-FFF2-40B4-BE49-F238E27FC236}">
-                <a16:creationId xmlns:a16="http://schemas.microsoft.com/office/drawing/2014/main" id="{BD917A5B-41A8-D57E-9C08-939CB58606EF}"/>
-              </a:ext>
-            </a:extLst>
-          </p:cNvPr>
-          <p:cNvPicPr preferRelativeResize="0">
-            <a:picLocks noChangeAspect="1"/>
-          </p:cNvPicPr>
-          <p:nvPr/>
-        </p:nvPicPr>
-        <p:blipFill>
-          <a:blip r:embed="rId2" cstate="print">
-            <a:extLst>
-              <a:ext uri="{28A0092B-C50C-407E-A947-70E740481C1C}">
-                <a14:useLocalDpi xmlns:a14="http://schemas.microsoft.com/office/drawing/2010/main" val="0"/>
-              </a:ext>
-            </a:extLst>
-          </a:blip>
-          <a:srcRect l="27137" t="16710" r="25806" b="43169"/>
-          <a:stretch/>
-        </p:blipFill>
-        <p:spPr>
-          <a:xfrm>
-            <a:off x="111949" y="-34240"/>
-            <a:ext cx="732113" cy="732113"/>
-          </a:xfrm>
-          <a:prstGeom prst="rect">
-            <a:avLst/>
-          </a:prstGeom>
-        </p:spPr>
-      </p:pic>
-      <p:sp>
-        <p:nvSpPr>
-          <p:cNvPr id="16" name="TextBox 15">
-            <a:extLst>
-              <a:ext uri="{FF2B5EF4-FFF2-40B4-BE49-F238E27FC236}">
-                <a16:creationId xmlns:a16="http://schemas.microsoft.com/office/drawing/2014/main" id="{B6388693-779B-63CA-8C34-CF62E79BED86}"/>
-              </a:ext>
-            </a:extLst>
-          </p:cNvPr>
-          <p:cNvSpPr txBox="1"/>
-          <p:nvPr/>
-        </p:nvSpPr>
-        <p:spPr>
-          <a:xfrm>
-            <a:off x="815332" y="-22127"/>
-            <a:ext cx="5096267" cy="707886"/>
-          </a:xfrm>
-          <a:prstGeom prst="rect">
-            <a:avLst/>
-          </a:prstGeom>
-          <a:noFill/>
-        </p:spPr>
-        <p:txBody>
-          <a:bodyPr wrap="none" rtlCol="0">
-            <a:spAutoFit/>
-          </a:bodyPr>
-          <a:lstStyle/>
-          <a:p>
-            <a:r>
-              <a:rPr lang="en-US" sz="4000" b="1" dirty="0" err="1">
-                <a:solidFill>
-                  <a:schemeClr val="bg1"/>
-                </a:solidFill>
-                <a:latin typeface="Bahnschrift SemiBold SemiConden" panose="020B0502040204020203" pitchFamily="34" charset="0"/>
-              </a:rPr>
-              <a:t>TechCore</a:t>
-            </a:r>
-            <a:r>
-              <a:rPr lang="en-US" sz="4000" b="1" dirty="0">
-                <a:solidFill>
-                  <a:schemeClr val="bg1"/>
-                </a:solidFill>
-                <a:latin typeface="Bahnschrift SemiBold SemiConden" panose="020B0502040204020203" pitchFamily="34" charset="0"/>
-              </a:rPr>
-              <a:t> Innovation- HR</a:t>
-            </a:r>
-          </a:p>
-        </p:txBody>
-      </p:sp>
-      <p:sp>
-        <p:nvSpPr>
-          <p:cNvPr id="19" name="Rectangle: Rounded Corners 18">
-            <a:extLst>
-              <a:ext uri="{FF2B5EF4-FFF2-40B4-BE49-F238E27FC236}">
-                <a16:creationId xmlns:a16="http://schemas.microsoft.com/office/drawing/2014/main" id="{D4D74A61-A305-C3DE-AEE7-C101BD4D1A5D}"/>
-              </a:ext>
-            </a:extLst>
-          </p:cNvPr>
-          <p:cNvSpPr/>
-          <p:nvPr/>
-        </p:nvSpPr>
-        <p:spPr>
-          <a:xfrm>
-            <a:off x="13099857" y="1810087"/>
-            <a:ext cx="4977126" cy="4098162"/>
-          </a:xfrm>
-          <a:prstGeom prst="roundRect">
-            <a:avLst>
-              <a:gd name="adj" fmla="val 7996"/>
-            </a:avLst>
-          </a:prstGeom>
-          <a:solidFill>
-            <a:schemeClr val="bg1">
-              <a:lumMod val="95000"/>
-            </a:schemeClr>
-          </a:solidFill>
-          <a:ln>
-            <a:noFill/>
-          </a:ln>
-          <a:effectLst>
-            <a:innerShdw blurRad="114300">
-              <a:prstClr val="black"/>
-            </a:innerShdw>
-          </a:effectLst>
-        </p:spPr>
-        <p:style>
-          <a:lnRef idx="2">
-            <a:schemeClr val="accent1">
-              <a:shade val="15000"/>
-            </a:schemeClr>
-          </a:lnRef>
-          <a:fillRef idx="1">
-            <a:schemeClr val="accent1"/>
-          </a:fillRef>
-          <a:effectRef idx="0">
-            <a:schemeClr val="accent1"/>
-          </a:effectRef>
-          <a:fontRef idx="minor">
-            <a:schemeClr val="lt1"/>
-          </a:fontRef>
-        </p:style>
-        <p:txBody>
-          <a:bodyPr rtlCol="0" anchor="ctr"/>
-          <a:lstStyle/>
-          <a:p>
-            <a:pPr algn="ctr"/>
-            <a:r>
-              <a:rPr lang="en-US" dirty="0"/>
-              <a:t>V</a:t>
-            </a:r>
-          </a:p>
-        </p:txBody>
-      </p:sp>
-      <p:sp>
-        <p:nvSpPr>
-          <p:cNvPr id="20" name="Rectangle: Rounded Corners 19">
-            <a:extLst>
-              <a:ext uri="{FF2B5EF4-FFF2-40B4-BE49-F238E27FC236}">
-                <a16:creationId xmlns:a16="http://schemas.microsoft.com/office/drawing/2014/main" id="{7EC7BDF2-7881-8601-7488-CED69AF549FC}"/>
-              </a:ext>
-            </a:extLst>
-          </p:cNvPr>
-          <p:cNvSpPr/>
-          <p:nvPr/>
-        </p:nvSpPr>
-        <p:spPr>
-          <a:xfrm>
-            <a:off x="13099858" y="6231764"/>
-            <a:ext cx="4977126" cy="3947777"/>
-          </a:xfrm>
-          <a:prstGeom prst="roundRect">
-            <a:avLst>
-              <a:gd name="adj" fmla="val 7996"/>
-            </a:avLst>
-          </a:prstGeom>
-          <a:solidFill>
-            <a:schemeClr val="bg1">
-              <a:lumMod val="95000"/>
-            </a:schemeClr>
-          </a:solidFill>
-          <a:ln>
-            <a:noFill/>
-          </a:ln>
-          <a:effectLst>
-            <a:innerShdw blurRad="114300">
-              <a:prstClr val="black"/>
-            </a:innerShdw>
-          </a:effectLst>
-        </p:spPr>
-        <p:style>
-          <a:lnRef idx="2">
-            <a:schemeClr val="accent1">
-              <a:shade val="15000"/>
-            </a:schemeClr>
-          </a:lnRef>
-          <a:fillRef idx="1">
-            <a:schemeClr val="accent1"/>
-          </a:fillRef>
-          <a:effectRef idx="0">
-            <a:schemeClr val="accent1"/>
-          </a:effectRef>
-          <a:fontRef idx="minor">
-            <a:schemeClr val="lt1"/>
-          </a:fontRef>
-        </p:style>
-        <p:txBody>
-          <a:bodyPr rtlCol="0" anchor="ctr"/>
-          <a:lstStyle/>
-          <a:p>
-            <a:pPr algn="ctr"/>
-            <a:endParaRPr lang="en-US"/>
-          </a:p>
-        </p:txBody>
-      </p:sp>
-      <p:sp>
-        <p:nvSpPr>
-          <p:cNvPr id="22" name="TextBox 21">
-            <a:extLst>
-              <a:ext uri="{FF2B5EF4-FFF2-40B4-BE49-F238E27FC236}">
-                <a16:creationId xmlns:a16="http://schemas.microsoft.com/office/drawing/2014/main" id="{FDB1AC1C-AFC7-8595-AC34-A069385CC317}"/>
-              </a:ext>
-            </a:extLst>
-          </p:cNvPr>
-          <p:cNvSpPr txBox="1"/>
-          <p:nvPr/>
-        </p:nvSpPr>
-        <p:spPr>
-          <a:xfrm>
-            <a:off x="602855" y="5952364"/>
-            <a:ext cx="231154" cy="369332"/>
-          </a:xfrm>
-          <a:prstGeom prst="rect">
-            <a:avLst/>
-          </a:prstGeom>
-          <a:noFill/>
-        </p:spPr>
-        <p:txBody>
-          <a:bodyPr wrap="none" rtlCol="0">
-            <a:spAutoFit/>
-          </a:bodyPr>
-          <a:lstStyle/>
-          <a:p>
-            <a:r>
-              <a:rPr lang="en-US" b="1" dirty="0">
-                <a:solidFill>
-                  <a:schemeClr val="bg2">
-                    <a:lumMod val="25000"/>
-                  </a:schemeClr>
-                </a:solidFill>
-              </a:rPr>
-              <a:t> </a:t>
-            </a:r>
-          </a:p>
-        </p:txBody>
-      </p:sp>
-      <p:sp>
-        <p:nvSpPr>
-          <p:cNvPr id="23" name="TextBox 22">
-            <a:extLst>
-              <a:ext uri="{FF2B5EF4-FFF2-40B4-BE49-F238E27FC236}">
-                <a16:creationId xmlns:a16="http://schemas.microsoft.com/office/drawing/2014/main" id="{A5B71380-FD92-18D0-3CC1-473E663C5E72}"/>
-              </a:ext>
-            </a:extLst>
-          </p:cNvPr>
-          <p:cNvSpPr txBox="1"/>
-          <p:nvPr/>
-        </p:nvSpPr>
-        <p:spPr>
-          <a:xfrm>
-            <a:off x="11333541" y="5952363"/>
-            <a:ext cx="1766317" cy="369332"/>
-          </a:xfrm>
-          <a:prstGeom prst="rect">
-            <a:avLst/>
-          </a:prstGeom>
-          <a:noFill/>
-        </p:spPr>
-        <p:txBody>
-          <a:bodyPr wrap="square" rtlCol="0">
-            <a:spAutoFit/>
-          </a:bodyPr>
-          <a:lstStyle/>
-          <a:p>
-            <a:r>
-              <a:rPr lang="en-US" b="1" dirty="0">
-                <a:solidFill>
-                  <a:schemeClr val="bg2">
-                    <a:lumMod val="25000"/>
-                  </a:schemeClr>
-                </a:solidFill>
-              </a:rPr>
-              <a:t> </a:t>
-            </a:r>
-          </a:p>
-        </p:txBody>
-      </p:sp>
-      <p:sp>
-        <p:nvSpPr>
-          <p:cNvPr id="2" name="TextBox 1">
-            <a:extLst>
-              <a:ext uri="{FF2B5EF4-FFF2-40B4-BE49-F238E27FC236}">
-                <a16:creationId xmlns:a16="http://schemas.microsoft.com/office/drawing/2014/main" id="{91950956-2209-65C0-60B6-8E570FBF11D8}"/>
-              </a:ext>
-            </a:extLst>
-          </p:cNvPr>
-          <p:cNvSpPr txBox="1"/>
-          <p:nvPr/>
-        </p:nvSpPr>
-        <p:spPr>
-          <a:xfrm>
-            <a:off x="602855" y="1181422"/>
-            <a:ext cx="1379417" cy="369332"/>
-          </a:xfrm>
-          <a:prstGeom prst="rect">
-            <a:avLst/>
-          </a:prstGeom>
-          <a:noFill/>
-        </p:spPr>
-        <p:txBody>
-          <a:bodyPr wrap="none" rtlCol="0">
-            <a:spAutoFit/>
-          </a:bodyPr>
-          <a:lstStyle/>
-          <a:p>
-            <a:r>
-              <a:rPr lang="en-US" b="1" dirty="0">
-                <a:solidFill>
-                  <a:schemeClr val="bg2">
-                    <a:lumMod val="25000"/>
-                  </a:schemeClr>
-                </a:solidFill>
-              </a:rPr>
-              <a:t>Date Range</a:t>
-            </a:r>
-          </a:p>
-        </p:txBody>
-      </p:sp>
-      <p:sp>
-        <p:nvSpPr>
-          <p:cNvPr id="3" name="Rectangle: Rounded Corners 2">
-            <a:extLst>
-              <a:ext uri="{FF2B5EF4-FFF2-40B4-BE49-F238E27FC236}">
-                <a16:creationId xmlns:a16="http://schemas.microsoft.com/office/drawing/2014/main" id="{96FBC524-4359-E64B-649E-69D8D4E45383}"/>
-              </a:ext>
-            </a:extLst>
-          </p:cNvPr>
-          <p:cNvSpPr/>
-          <p:nvPr/>
-        </p:nvSpPr>
-        <p:spPr>
-          <a:xfrm>
-            <a:off x="6829032" y="4334637"/>
-            <a:ext cx="6029718" cy="5844903"/>
-          </a:xfrm>
-          <a:prstGeom prst="roundRect">
-            <a:avLst>
-              <a:gd name="adj" fmla="val 7996"/>
-            </a:avLst>
-          </a:prstGeom>
-          <a:solidFill>
-            <a:schemeClr val="bg1">
-              <a:lumMod val="95000"/>
-            </a:schemeClr>
-          </a:solidFill>
-          <a:ln>
-            <a:noFill/>
-          </a:ln>
-          <a:effectLst>
-            <a:innerShdw blurRad="114300">
-              <a:prstClr val="black"/>
-            </a:innerShdw>
-          </a:effectLst>
-        </p:spPr>
-        <p:style>
-          <a:lnRef idx="2">
-            <a:schemeClr val="accent1">
-              <a:shade val="15000"/>
-            </a:schemeClr>
-          </a:lnRef>
-          <a:fillRef idx="1">
-            <a:schemeClr val="accent1"/>
-          </a:fillRef>
-          <a:effectRef idx="0">
-            <a:schemeClr val="accent1"/>
-          </a:effectRef>
-          <a:fontRef idx="minor">
-            <a:schemeClr val="lt1"/>
-          </a:fontRef>
-        </p:style>
-        <p:txBody>
-          <a:bodyPr rtlCol="0" anchor="ctr"/>
-          <a:lstStyle/>
-          <a:p>
-            <a:pPr algn="ctr"/>
-            <a:endParaRPr lang="en-US" dirty="0"/>
-          </a:p>
-        </p:txBody>
-      </p:sp>
-      <p:sp>
-        <p:nvSpPr>
-          <p:cNvPr id="5" name="TextBox 4">
-            <a:extLst>
-              <a:ext uri="{FF2B5EF4-FFF2-40B4-BE49-F238E27FC236}">
-                <a16:creationId xmlns:a16="http://schemas.microsoft.com/office/drawing/2014/main" id="{EAB32092-458A-770A-C1D3-4B504494B8B5}"/>
-              </a:ext>
-            </a:extLst>
-          </p:cNvPr>
-          <p:cNvSpPr txBox="1"/>
-          <p:nvPr/>
-        </p:nvSpPr>
-        <p:spPr>
-          <a:xfrm>
-            <a:off x="7374958" y="1933018"/>
-            <a:ext cx="2986086" cy="369332"/>
-          </a:xfrm>
-          <a:prstGeom prst="rect">
-            <a:avLst/>
-          </a:prstGeom>
-          <a:noFill/>
-        </p:spPr>
-        <p:txBody>
-          <a:bodyPr wrap="square" rtlCol="0">
-            <a:spAutoFit/>
-          </a:bodyPr>
-          <a:lstStyle/>
-          <a:p>
-            <a:r>
-              <a:rPr lang="en-US" b="1" dirty="0">
-                <a:solidFill>
-                  <a:schemeClr val="bg2">
-                    <a:lumMod val="25000"/>
-                  </a:schemeClr>
-                </a:solidFill>
-              </a:rPr>
-              <a:t>Leave Status Insight</a:t>
-            </a:r>
-          </a:p>
-        </p:txBody>
-      </p:sp>
-      <p:sp>
-        <p:nvSpPr>
-          <p:cNvPr id="10" name="TextBox 9">
-            <a:extLst>
-              <a:ext uri="{FF2B5EF4-FFF2-40B4-BE49-F238E27FC236}">
-                <a16:creationId xmlns:a16="http://schemas.microsoft.com/office/drawing/2014/main" id="{CB5A433D-3A4B-CCA9-C2CA-CB2EF83F2232}"/>
-              </a:ext>
-            </a:extLst>
-          </p:cNvPr>
-          <p:cNvSpPr txBox="1"/>
-          <p:nvPr/>
-        </p:nvSpPr>
-        <p:spPr>
-          <a:xfrm>
-            <a:off x="711988" y="1846262"/>
-            <a:ext cx="3882473" cy="369332"/>
-          </a:xfrm>
-          <a:prstGeom prst="rect">
-            <a:avLst/>
-          </a:prstGeom>
-          <a:noFill/>
-        </p:spPr>
-        <p:txBody>
-          <a:bodyPr wrap="none" rtlCol="0">
-            <a:spAutoFit/>
-          </a:bodyPr>
-          <a:lstStyle/>
-          <a:p>
-            <a:r>
-              <a:rPr lang="en-US" b="1" dirty="0">
-                <a:solidFill>
-                  <a:schemeClr val="bg2">
-                    <a:lumMod val="25000"/>
-                  </a:schemeClr>
-                </a:solidFill>
-              </a:rPr>
-              <a:t>Average Days on Leave by Age range</a:t>
-            </a:r>
-          </a:p>
-        </p:txBody>
-      </p:sp>
-      <p:sp>
-        <p:nvSpPr>
-          <p:cNvPr id="17" name="TextBox 16">
-            <a:extLst>
-              <a:ext uri="{FF2B5EF4-FFF2-40B4-BE49-F238E27FC236}">
-                <a16:creationId xmlns:a16="http://schemas.microsoft.com/office/drawing/2014/main" id="{06E7D70F-029B-7409-2697-F8222FB476B5}"/>
-              </a:ext>
-            </a:extLst>
-          </p:cNvPr>
-          <p:cNvSpPr txBox="1"/>
-          <p:nvPr/>
-        </p:nvSpPr>
-        <p:spPr>
-          <a:xfrm>
-            <a:off x="782004" y="5862432"/>
-            <a:ext cx="4022383" cy="369332"/>
-          </a:xfrm>
-          <a:prstGeom prst="rect">
-            <a:avLst/>
-          </a:prstGeom>
-          <a:noFill/>
-        </p:spPr>
-        <p:txBody>
-          <a:bodyPr wrap="none" rtlCol="0">
-            <a:spAutoFit/>
-          </a:bodyPr>
-          <a:lstStyle/>
-          <a:p>
-            <a:r>
-              <a:rPr lang="en-US" b="1" dirty="0">
-                <a:solidFill>
-                  <a:schemeClr val="bg2">
-                    <a:lumMod val="25000"/>
-                  </a:schemeClr>
-                </a:solidFill>
-              </a:rPr>
-              <a:t>Annual Leave Utilization by Ethnicity </a:t>
-            </a:r>
-          </a:p>
-        </p:txBody>
-      </p:sp>
-      <p:sp>
-        <p:nvSpPr>
-          <p:cNvPr id="18" name="TextBox 17">
-            <a:extLst>
-              <a:ext uri="{FF2B5EF4-FFF2-40B4-BE49-F238E27FC236}">
-                <a16:creationId xmlns:a16="http://schemas.microsoft.com/office/drawing/2014/main" id="{FFE6A722-F322-B3AA-F6EE-700FA8A68B7B}"/>
-              </a:ext>
-            </a:extLst>
-          </p:cNvPr>
-          <p:cNvSpPr txBox="1"/>
-          <p:nvPr/>
-        </p:nvSpPr>
-        <p:spPr>
-          <a:xfrm>
-            <a:off x="7227613" y="4488414"/>
-            <a:ext cx="5440079" cy="369332"/>
-          </a:xfrm>
-          <a:prstGeom prst="rect">
-            <a:avLst/>
-          </a:prstGeom>
-          <a:noFill/>
-        </p:spPr>
-        <p:txBody>
-          <a:bodyPr wrap="none" rtlCol="0">
-            <a:spAutoFit/>
-          </a:bodyPr>
-          <a:lstStyle/>
-          <a:p>
-            <a:r>
-              <a:rPr lang="en-US" b="1" dirty="0">
-                <a:solidFill>
-                  <a:schemeClr val="bg2">
-                    <a:lumMod val="25000"/>
-                  </a:schemeClr>
-                </a:solidFill>
-              </a:rPr>
-              <a:t>Average Cost of Remaining Annual Leave by Dept </a:t>
-            </a:r>
-          </a:p>
-        </p:txBody>
-      </p:sp>
-      <p:sp>
-        <p:nvSpPr>
-          <p:cNvPr id="24" name="TextBox 23">
-            <a:extLst>
-              <a:ext uri="{FF2B5EF4-FFF2-40B4-BE49-F238E27FC236}">
-                <a16:creationId xmlns:a16="http://schemas.microsoft.com/office/drawing/2014/main" id="{905E8066-695D-0137-7578-298B6BCADEB6}"/>
-              </a:ext>
-            </a:extLst>
-          </p:cNvPr>
-          <p:cNvSpPr txBox="1"/>
-          <p:nvPr/>
-        </p:nvSpPr>
-        <p:spPr>
-          <a:xfrm>
-            <a:off x="13463899" y="2216665"/>
-            <a:ext cx="2794996" cy="369332"/>
-          </a:xfrm>
-          <a:prstGeom prst="rect">
-            <a:avLst/>
-          </a:prstGeom>
-          <a:noFill/>
-        </p:spPr>
-        <p:txBody>
-          <a:bodyPr wrap="none" rtlCol="0">
-            <a:spAutoFit/>
-          </a:bodyPr>
-          <a:lstStyle/>
-          <a:p>
-            <a:r>
-              <a:rPr lang="en-US" b="1" dirty="0">
-                <a:solidFill>
-                  <a:schemeClr val="bg2">
-                    <a:lumMod val="25000"/>
-                  </a:schemeClr>
-                </a:solidFill>
-              </a:rPr>
-              <a:t>Average Total Leave Days</a:t>
-            </a:r>
-          </a:p>
-        </p:txBody>
-      </p:sp>
-      <p:sp>
-        <p:nvSpPr>
-          <p:cNvPr id="25" name="TextBox 24">
-            <a:extLst>
-              <a:ext uri="{FF2B5EF4-FFF2-40B4-BE49-F238E27FC236}">
-                <a16:creationId xmlns:a16="http://schemas.microsoft.com/office/drawing/2014/main" id="{071B408C-B1DB-5DE1-2683-79C4B2ED7BE9}"/>
-              </a:ext>
-            </a:extLst>
-          </p:cNvPr>
-          <p:cNvSpPr txBox="1"/>
-          <p:nvPr/>
-        </p:nvSpPr>
-        <p:spPr>
-          <a:xfrm>
-            <a:off x="13591113" y="6523860"/>
-            <a:ext cx="1452642" cy="369332"/>
-          </a:xfrm>
-          <a:prstGeom prst="rect">
-            <a:avLst/>
-          </a:prstGeom>
-          <a:noFill/>
-        </p:spPr>
-        <p:txBody>
-          <a:bodyPr wrap="none" rtlCol="0">
-            <a:spAutoFit/>
-          </a:bodyPr>
-          <a:lstStyle/>
-          <a:p>
-            <a:r>
-              <a:rPr lang="en-US" b="1" dirty="0">
-                <a:solidFill>
-                  <a:schemeClr val="bg2">
-                    <a:lumMod val="25000"/>
-                  </a:schemeClr>
-                </a:solidFill>
-              </a:rPr>
-              <a:t>Department</a:t>
-            </a:r>
-          </a:p>
-        </p:txBody>
-      </p:sp>
-      <p:sp>
-        <p:nvSpPr>
-          <p:cNvPr id="27" name="TextBox 26">
-            <a:extLst>
-              <a:ext uri="{FF2B5EF4-FFF2-40B4-BE49-F238E27FC236}">
-                <a16:creationId xmlns:a16="http://schemas.microsoft.com/office/drawing/2014/main" id="{9B98FB06-AEE8-C4F6-5E54-D70DEAF419FA}"/>
-              </a:ext>
-            </a:extLst>
-          </p:cNvPr>
-          <p:cNvSpPr txBox="1"/>
-          <p:nvPr/>
-        </p:nvSpPr>
-        <p:spPr>
-          <a:xfrm>
-            <a:off x="13511835" y="4700836"/>
-            <a:ext cx="2483565" cy="667327"/>
-          </a:xfrm>
-          <a:prstGeom prst="rect">
-            <a:avLst/>
-          </a:prstGeom>
-          <a:noFill/>
-        </p:spPr>
-        <p:txBody>
-          <a:bodyPr wrap="square" rtlCol="0">
-            <a:spAutoFit/>
-          </a:bodyPr>
-          <a:lstStyle/>
-          <a:p>
-            <a:r>
-              <a:rPr lang="en-US" b="1" dirty="0">
-                <a:solidFill>
-                  <a:schemeClr val="bg2">
-                    <a:lumMod val="25000"/>
-                  </a:schemeClr>
-                </a:solidFill>
-              </a:rPr>
-              <a:t>Average Annual Leave Liability</a:t>
-            </a:r>
-          </a:p>
-        </p:txBody>
-      </p:sp>
-      <p:sp>
-        <p:nvSpPr>
-          <p:cNvPr id="28" name="TextBox 27">
-            <a:extLst>
-              <a:ext uri="{FF2B5EF4-FFF2-40B4-BE49-F238E27FC236}">
-                <a16:creationId xmlns:a16="http://schemas.microsoft.com/office/drawing/2014/main" id="{0A445901-6D56-6B42-B022-297B5AD190D4}"/>
-              </a:ext>
-            </a:extLst>
-          </p:cNvPr>
-          <p:cNvSpPr txBox="1"/>
-          <p:nvPr/>
-        </p:nvSpPr>
-        <p:spPr>
-          <a:xfrm>
-            <a:off x="13511835" y="3823015"/>
-            <a:ext cx="2462725" cy="369332"/>
-          </a:xfrm>
-          <a:prstGeom prst="rect">
-            <a:avLst/>
-          </a:prstGeom>
-          <a:noFill/>
-        </p:spPr>
-        <p:txBody>
-          <a:bodyPr wrap="none" rtlCol="0">
-            <a:spAutoFit/>
-          </a:bodyPr>
-          <a:lstStyle/>
-          <a:p>
-            <a:r>
-              <a:rPr lang="en-US" b="1" dirty="0">
-                <a:solidFill>
-                  <a:schemeClr val="bg2">
-                    <a:lumMod val="25000"/>
-                  </a:schemeClr>
-                </a:solidFill>
-              </a:rPr>
-              <a:t>Annual Leave Liability</a:t>
-            </a:r>
-          </a:p>
-        </p:txBody>
-      </p:sp>
-      <p:sp>
-        <p:nvSpPr>
-          <p:cNvPr id="29" name="TextBox 28">
-            <a:extLst>
-              <a:ext uri="{FF2B5EF4-FFF2-40B4-BE49-F238E27FC236}">
-                <a16:creationId xmlns:a16="http://schemas.microsoft.com/office/drawing/2014/main" id="{B1F53B3B-9599-CA10-3813-65219650BD51}"/>
-              </a:ext>
-            </a:extLst>
-          </p:cNvPr>
-          <p:cNvSpPr txBox="1"/>
-          <p:nvPr/>
-        </p:nvSpPr>
-        <p:spPr>
-          <a:xfrm>
-            <a:off x="13511835" y="3030918"/>
-            <a:ext cx="2483565" cy="369332"/>
-          </a:xfrm>
-          <a:prstGeom prst="rect">
-            <a:avLst/>
-          </a:prstGeom>
-          <a:noFill/>
-        </p:spPr>
-        <p:txBody>
-          <a:bodyPr wrap="none" rtlCol="0">
-            <a:spAutoFit/>
-          </a:bodyPr>
-          <a:lstStyle/>
-          <a:p>
-            <a:r>
-              <a:rPr lang="en-US" b="1" dirty="0">
-                <a:solidFill>
-                  <a:schemeClr val="bg2">
-                    <a:lumMod val="25000"/>
-                  </a:schemeClr>
-                </a:solidFill>
-              </a:rPr>
-              <a:t>Annual Leave Balance</a:t>
-            </a:r>
-          </a:p>
-        </p:txBody>
-      </p:sp>
-    </p:spTree>
-    <p:extLst>
-      <p:ext uri="{BB962C8B-B14F-4D97-AF65-F5344CB8AC3E}">
-        <p14:creationId xmlns:p14="http://schemas.microsoft.com/office/powerpoint/2010/main" val="1909225561"/>
-      </p:ext>
-    </p:extLst>
-  </p:cSld>
-  <p:clrMapOvr>
-    <a:masterClrMapping/>
-  </p:clrMapOvr>
-</p:sld>
-</file>
-
 <file path=ppt/slides/slide15.xml><?xml version="1.0" encoding="utf-8"?>
 <p:sld xmlns:a="http://schemas.openxmlformats.org/drawingml/2006/main" xmlns:r="http://schemas.openxmlformats.org/officeDocument/2006/relationships" xmlns:p="http://schemas.openxmlformats.org/presentationml/2006/main">
   <p:cSld>
@@ -7562,8 +7321,8 @@
         </p:nvSpPr>
         <p:spPr>
           <a:xfrm>
-            <a:off x="108571" y="1754192"/>
-            <a:ext cx="11224969" cy="8422178"/>
+            <a:off x="108572" y="1757362"/>
+            <a:ext cx="6479352" cy="8422178"/>
           </a:xfrm>
           <a:prstGeom prst="roundRect">
             <a:avLst>
@@ -7623,8 +7382,8 @@
         </p:nvSpPr>
         <p:spPr>
           <a:xfrm>
-            <a:off x="11499136" y="6121264"/>
-            <a:ext cx="4504453" cy="3967580"/>
+            <a:off x="6829032" y="1854200"/>
+            <a:ext cx="6029718" cy="2278260"/>
           </a:xfrm>
           <a:prstGeom prst="roundRect">
             <a:avLst>
@@ -7666,7 +7425,7 @@
           <a:lstStyle/>
           <a:p>
             <a:pPr algn="ctr"/>
-            <a:endParaRPr lang="en-US" dirty="0"/>
+            <a:endParaRPr lang="en-US"/>
           </a:p>
         </p:txBody>
       </p:sp>
@@ -7768,8 +7527,8 @@
         </p:nvSpPr>
         <p:spPr>
           <a:xfrm>
-            <a:off x="11499136" y="1751568"/>
-            <a:ext cx="4504453" cy="4142274"/>
+            <a:off x="13099857" y="1810087"/>
+            <a:ext cx="4977126" cy="4098162"/>
           </a:xfrm>
           <a:prstGeom prst="roundRect">
             <a:avLst>
@@ -7832,8 +7591,8 @@
         </p:nvSpPr>
         <p:spPr>
           <a:xfrm>
-            <a:off x="16169185" y="1776356"/>
-            <a:ext cx="1977524" cy="8312488"/>
+            <a:off x="13099858" y="6231764"/>
+            <a:ext cx="4977126" cy="3947777"/>
           </a:xfrm>
           <a:prstGeom prst="roundRect">
             <a:avLst>
@@ -8004,6 +7763,1095 @@
       </p:sp>
       <p:sp>
         <p:nvSpPr>
+          <p:cNvPr id="3" name="Rectangle: Rounded Corners 2">
+            <a:extLst>
+              <a:ext uri="{FF2B5EF4-FFF2-40B4-BE49-F238E27FC236}">
+                <a16:creationId xmlns:a16="http://schemas.microsoft.com/office/drawing/2014/main" id="{96FBC524-4359-E64B-649E-69D8D4E45383}"/>
+              </a:ext>
+            </a:extLst>
+          </p:cNvPr>
+          <p:cNvSpPr/>
+          <p:nvPr/>
+        </p:nvSpPr>
+        <p:spPr>
+          <a:xfrm>
+            <a:off x="6829032" y="4334637"/>
+            <a:ext cx="6029718" cy="5844903"/>
+          </a:xfrm>
+          <a:prstGeom prst="roundRect">
+            <a:avLst>
+              <a:gd name="adj" fmla="val 7996"/>
+            </a:avLst>
+          </a:prstGeom>
+          <a:solidFill>
+            <a:schemeClr val="bg1">
+              <a:lumMod val="95000"/>
+            </a:schemeClr>
+          </a:solidFill>
+          <a:ln>
+            <a:noFill/>
+          </a:ln>
+          <a:effectLst>
+            <a:innerShdw blurRad="114300">
+              <a:prstClr val="black"/>
+            </a:innerShdw>
+          </a:effectLst>
+        </p:spPr>
+        <p:style>
+          <a:lnRef idx="2">
+            <a:schemeClr val="accent1">
+              <a:shade val="15000"/>
+            </a:schemeClr>
+          </a:lnRef>
+          <a:fillRef idx="1">
+            <a:schemeClr val="accent1"/>
+          </a:fillRef>
+          <a:effectRef idx="0">
+            <a:schemeClr val="accent1"/>
+          </a:effectRef>
+          <a:fontRef idx="minor">
+            <a:schemeClr val="lt1"/>
+          </a:fontRef>
+        </p:style>
+        <p:txBody>
+          <a:bodyPr rtlCol="0" anchor="ctr"/>
+          <a:lstStyle/>
+          <a:p>
+            <a:pPr algn="ctr"/>
+            <a:endParaRPr lang="en-US" dirty="0"/>
+          </a:p>
+        </p:txBody>
+      </p:sp>
+      <p:sp>
+        <p:nvSpPr>
+          <p:cNvPr id="5" name="TextBox 4">
+            <a:extLst>
+              <a:ext uri="{FF2B5EF4-FFF2-40B4-BE49-F238E27FC236}">
+                <a16:creationId xmlns:a16="http://schemas.microsoft.com/office/drawing/2014/main" id="{EAB32092-458A-770A-C1D3-4B504494B8B5}"/>
+              </a:ext>
+            </a:extLst>
+          </p:cNvPr>
+          <p:cNvSpPr txBox="1"/>
+          <p:nvPr/>
+        </p:nvSpPr>
+        <p:spPr>
+          <a:xfrm>
+            <a:off x="7374958" y="1933018"/>
+            <a:ext cx="2986086" cy="369332"/>
+          </a:xfrm>
+          <a:prstGeom prst="rect">
+            <a:avLst/>
+          </a:prstGeom>
+          <a:noFill/>
+        </p:spPr>
+        <p:txBody>
+          <a:bodyPr wrap="square" rtlCol="0">
+            <a:spAutoFit/>
+          </a:bodyPr>
+          <a:lstStyle/>
+          <a:p>
+            <a:r>
+              <a:rPr lang="en-US" b="1" dirty="0">
+                <a:solidFill>
+                  <a:schemeClr val="bg2">
+                    <a:lumMod val="25000"/>
+                  </a:schemeClr>
+                </a:solidFill>
+              </a:rPr>
+              <a:t>Leave Status Insight</a:t>
+            </a:r>
+          </a:p>
+        </p:txBody>
+      </p:sp>
+      <p:sp>
+        <p:nvSpPr>
+          <p:cNvPr id="10" name="TextBox 9">
+            <a:extLst>
+              <a:ext uri="{FF2B5EF4-FFF2-40B4-BE49-F238E27FC236}">
+                <a16:creationId xmlns:a16="http://schemas.microsoft.com/office/drawing/2014/main" id="{CB5A433D-3A4B-CCA9-C2CA-CB2EF83F2232}"/>
+              </a:ext>
+            </a:extLst>
+          </p:cNvPr>
+          <p:cNvSpPr txBox="1"/>
+          <p:nvPr/>
+        </p:nvSpPr>
+        <p:spPr>
+          <a:xfrm>
+            <a:off x="711988" y="1846262"/>
+            <a:ext cx="3882473" cy="369332"/>
+          </a:xfrm>
+          <a:prstGeom prst="rect">
+            <a:avLst/>
+          </a:prstGeom>
+          <a:noFill/>
+        </p:spPr>
+        <p:txBody>
+          <a:bodyPr wrap="none" rtlCol="0">
+            <a:spAutoFit/>
+          </a:bodyPr>
+          <a:lstStyle/>
+          <a:p>
+            <a:r>
+              <a:rPr lang="en-US" b="1" dirty="0">
+                <a:solidFill>
+                  <a:schemeClr val="bg2">
+                    <a:lumMod val="25000"/>
+                  </a:schemeClr>
+                </a:solidFill>
+              </a:rPr>
+              <a:t>Average Days on Leave by Age range</a:t>
+            </a:r>
+          </a:p>
+        </p:txBody>
+      </p:sp>
+      <p:sp>
+        <p:nvSpPr>
+          <p:cNvPr id="17" name="TextBox 16">
+            <a:extLst>
+              <a:ext uri="{FF2B5EF4-FFF2-40B4-BE49-F238E27FC236}">
+                <a16:creationId xmlns:a16="http://schemas.microsoft.com/office/drawing/2014/main" id="{06E7D70F-029B-7409-2697-F8222FB476B5}"/>
+              </a:ext>
+            </a:extLst>
+          </p:cNvPr>
+          <p:cNvSpPr txBox="1"/>
+          <p:nvPr/>
+        </p:nvSpPr>
+        <p:spPr>
+          <a:xfrm>
+            <a:off x="782004" y="5862432"/>
+            <a:ext cx="4022383" cy="369332"/>
+          </a:xfrm>
+          <a:prstGeom prst="rect">
+            <a:avLst/>
+          </a:prstGeom>
+          <a:noFill/>
+        </p:spPr>
+        <p:txBody>
+          <a:bodyPr wrap="none" rtlCol="0">
+            <a:spAutoFit/>
+          </a:bodyPr>
+          <a:lstStyle/>
+          <a:p>
+            <a:r>
+              <a:rPr lang="en-US" b="1" dirty="0">
+                <a:solidFill>
+                  <a:schemeClr val="bg2">
+                    <a:lumMod val="25000"/>
+                  </a:schemeClr>
+                </a:solidFill>
+              </a:rPr>
+              <a:t>Annual Leave Utilization by Ethnicity </a:t>
+            </a:r>
+          </a:p>
+        </p:txBody>
+      </p:sp>
+      <p:sp>
+        <p:nvSpPr>
+          <p:cNvPr id="18" name="TextBox 17">
+            <a:extLst>
+              <a:ext uri="{FF2B5EF4-FFF2-40B4-BE49-F238E27FC236}">
+                <a16:creationId xmlns:a16="http://schemas.microsoft.com/office/drawing/2014/main" id="{FFE6A722-F322-B3AA-F6EE-700FA8A68B7B}"/>
+              </a:ext>
+            </a:extLst>
+          </p:cNvPr>
+          <p:cNvSpPr txBox="1"/>
+          <p:nvPr/>
+        </p:nvSpPr>
+        <p:spPr>
+          <a:xfrm>
+            <a:off x="7227613" y="4488414"/>
+            <a:ext cx="5440079" cy="369332"/>
+          </a:xfrm>
+          <a:prstGeom prst="rect">
+            <a:avLst/>
+          </a:prstGeom>
+          <a:noFill/>
+        </p:spPr>
+        <p:txBody>
+          <a:bodyPr wrap="none" rtlCol="0">
+            <a:spAutoFit/>
+          </a:bodyPr>
+          <a:lstStyle/>
+          <a:p>
+            <a:r>
+              <a:rPr lang="en-US" b="1" dirty="0">
+                <a:solidFill>
+                  <a:schemeClr val="bg2">
+                    <a:lumMod val="25000"/>
+                  </a:schemeClr>
+                </a:solidFill>
+              </a:rPr>
+              <a:t>Average Cost of Remaining Annual Leave by Dept </a:t>
+            </a:r>
+          </a:p>
+        </p:txBody>
+      </p:sp>
+      <p:sp>
+        <p:nvSpPr>
+          <p:cNvPr id="24" name="TextBox 23">
+            <a:extLst>
+              <a:ext uri="{FF2B5EF4-FFF2-40B4-BE49-F238E27FC236}">
+                <a16:creationId xmlns:a16="http://schemas.microsoft.com/office/drawing/2014/main" id="{905E8066-695D-0137-7578-298B6BCADEB6}"/>
+              </a:ext>
+            </a:extLst>
+          </p:cNvPr>
+          <p:cNvSpPr txBox="1"/>
+          <p:nvPr/>
+        </p:nvSpPr>
+        <p:spPr>
+          <a:xfrm>
+            <a:off x="13463899" y="2216665"/>
+            <a:ext cx="2794996" cy="369332"/>
+          </a:xfrm>
+          <a:prstGeom prst="rect">
+            <a:avLst/>
+          </a:prstGeom>
+          <a:noFill/>
+        </p:spPr>
+        <p:txBody>
+          <a:bodyPr wrap="none" rtlCol="0">
+            <a:spAutoFit/>
+          </a:bodyPr>
+          <a:lstStyle/>
+          <a:p>
+            <a:r>
+              <a:rPr lang="en-US" b="1" dirty="0">
+                <a:solidFill>
+                  <a:schemeClr val="bg2">
+                    <a:lumMod val="25000"/>
+                  </a:schemeClr>
+                </a:solidFill>
+              </a:rPr>
+              <a:t>Average Total Leave Days</a:t>
+            </a:r>
+          </a:p>
+        </p:txBody>
+      </p:sp>
+      <p:sp>
+        <p:nvSpPr>
+          <p:cNvPr id="25" name="TextBox 24">
+            <a:extLst>
+              <a:ext uri="{FF2B5EF4-FFF2-40B4-BE49-F238E27FC236}">
+                <a16:creationId xmlns:a16="http://schemas.microsoft.com/office/drawing/2014/main" id="{071B408C-B1DB-5DE1-2683-79C4B2ED7BE9}"/>
+              </a:ext>
+            </a:extLst>
+          </p:cNvPr>
+          <p:cNvSpPr txBox="1"/>
+          <p:nvPr/>
+        </p:nvSpPr>
+        <p:spPr>
+          <a:xfrm>
+            <a:off x="13591113" y="6523860"/>
+            <a:ext cx="1452642" cy="369332"/>
+          </a:xfrm>
+          <a:prstGeom prst="rect">
+            <a:avLst/>
+          </a:prstGeom>
+          <a:noFill/>
+        </p:spPr>
+        <p:txBody>
+          <a:bodyPr wrap="none" rtlCol="0">
+            <a:spAutoFit/>
+          </a:bodyPr>
+          <a:lstStyle/>
+          <a:p>
+            <a:r>
+              <a:rPr lang="en-US" b="1" dirty="0">
+                <a:solidFill>
+                  <a:schemeClr val="bg2">
+                    <a:lumMod val="25000"/>
+                  </a:schemeClr>
+                </a:solidFill>
+              </a:rPr>
+              <a:t>Department</a:t>
+            </a:r>
+          </a:p>
+        </p:txBody>
+      </p:sp>
+      <p:sp>
+        <p:nvSpPr>
+          <p:cNvPr id="27" name="TextBox 26">
+            <a:extLst>
+              <a:ext uri="{FF2B5EF4-FFF2-40B4-BE49-F238E27FC236}">
+                <a16:creationId xmlns:a16="http://schemas.microsoft.com/office/drawing/2014/main" id="{9B98FB06-AEE8-C4F6-5E54-D70DEAF419FA}"/>
+              </a:ext>
+            </a:extLst>
+          </p:cNvPr>
+          <p:cNvSpPr txBox="1"/>
+          <p:nvPr/>
+        </p:nvSpPr>
+        <p:spPr>
+          <a:xfrm>
+            <a:off x="13511835" y="4700836"/>
+            <a:ext cx="2483565" cy="667327"/>
+          </a:xfrm>
+          <a:prstGeom prst="rect">
+            <a:avLst/>
+          </a:prstGeom>
+          <a:noFill/>
+        </p:spPr>
+        <p:txBody>
+          <a:bodyPr wrap="square" rtlCol="0">
+            <a:spAutoFit/>
+          </a:bodyPr>
+          <a:lstStyle/>
+          <a:p>
+            <a:r>
+              <a:rPr lang="en-US" b="1" dirty="0">
+                <a:solidFill>
+                  <a:schemeClr val="bg2">
+                    <a:lumMod val="25000"/>
+                  </a:schemeClr>
+                </a:solidFill>
+              </a:rPr>
+              <a:t>Average Annual Leave Liability</a:t>
+            </a:r>
+          </a:p>
+        </p:txBody>
+      </p:sp>
+      <p:sp>
+        <p:nvSpPr>
+          <p:cNvPr id="28" name="TextBox 27">
+            <a:extLst>
+              <a:ext uri="{FF2B5EF4-FFF2-40B4-BE49-F238E27FC236}">
+                <a16:creationId xmlns:a16="http://schemas.microsoft.com/office/drawing/2014/main" id="{0A445901-6D56-6B42-B022-297B5AD190D4}"/>
+              </a:ext>
+            </a:extLst>
+          </p:cNvPr>
+          <p:cNvSpPr txBox="1"/>
+          <p:nvPr/>
+        </p:nvSpPr>
+        <p:spPr>
+          <a:xfrm>
+            <a:off x="13511835" y="3823015"/>
+            <a:ext cx="2462725" cy="369332"/>
+          </a:xfrm>
+          <a:prstGeom prst="rect">
+            <a:avLst/>
+          </a:prstGeom>
+          <a:noFill/>
+        </p:spPr>
+        <p:txBody>
+          <a:bodyPr wrap="none" rtlCol="0">
+            <a:spAutoFit/>
+          </a:bodyPr>
+          <a:lstStyle/>
+          <a:p>
+            <a:r>
+              <a:rPr lang="en-US" b="1" dirty="0">
+                <a:solidFill>
+                  <a:schemeClr val="bg2">
+                    <a:lumMod val="25000"/>
+                  </a:schemeClr>
+                </a:solidFill>
+              </a:rPr>
+              <a:t>Annual Leave Liability</a:t>
+            </a:r>
+          </a:p>
+        </p:txBody>
+      </p:sp>
+      <p:sp>
+        <p:nvSpPr>
+          <p:cNvPr id="29" name="TextBox 28">
+            <a:extLst>
+              <a:ext uri="{FF2B5EF4-FFF2-40B4-BE49-F238E27FC236}">
+                <a16:creationId xmlns:a16="http://schemas.microsoft.com/office/drawing/2014/main" id="{B1F53B3B-9599-CA10-3813-65219650BD51}"/>
+              </a:ext>
+            </a:extLst>
+          </p:cNvPr>
+          <p:cNvSpPr txBox="1"/>
+          <p:nvPr/>
+        </p:nvSpPr>
+        <p:spPr>
+          <a:xfrm>
+            <a:off x="13511835" y="3030918"/>
+            <a:ext cx="2483565" cy="369332"/>
+          </a:xfrm>
+          <a:prstGeom prst="rect">
+            <a:avLst/>
+          </a:prstGeom>
+          <a:noFill/>
+        </p:spPr>
+        <p:txBody>
+          <a:bodyPr wrap="none" rtlCol="0">
+            <a:spAutoFit/>
+          </a:bodyPr>
+          <a:lstStyle/>
+          <a:p>
+            <a:r>
+              <a:rPr lang="en-US" b="1" dirty="0">
+                <a:solidFill>
+                  <a:schemeClr val="bg2">
+                    <a:lumMod val="25000"/>
+                  </a:schemeClr>
+                </a:solidFill>
+              </a:rPr>
+              <a:t>Annual Leave Balance</a:t>
+            </a:r>
+          </a:p>
+        </p:txBody>
+      </p:sp>
+    </p:spTree>
+    <p:extLst>
+      <p:ext uri="{BB962C8B-B14F-4D97-AF65-F5344CB8AC3E}">
+        <p14:creationId xmlns:p14="http://schemas.microsoft.com/office/powerpoint/2010/main" val="1909225561"/>
+      </p:ext>
+    </p:extLst>
+  </p:cSld>
+  <p:clrMapOvr>
+    <a:masterClrMapping/>
+  </p:clrMapOvr>
+</p:sld>
+</file>
+
+<file path=ppt/slides/slide16.xml><?xml version="1.0" encoding="utf-8"?>
+<p:sld xmlns:a="http://schemas.openxmlformats.org/drawingml/2006/main" xmlns:r="http://schemas.openxmlformats.org/officeDocument/2006/relationships" xmlns:p="http://schemas.openxmlformats.org/presentationml/2006/main">
+  <p:cSld>
+    <p:spTree>
+      <p:nvGrpSpPr>
+        <p:cNvPr id="1" name="">
+          <a:extLst>
+            <a:ext uri="{FF2B5EF4-FFF2-40B4-BE49-F238E27FC236}">
+              <a16:creationId xmlns:a16="http://schemas.microsoft.com/office/drawing/2014/main" id="{04AEC289-3B22-0D11-6E42-2F521D8C61CF}"/>
+            </a:ext>
+          </a:extLst>
+        </p:cNvPr>
+        <p:cNvGrpSpPr/>
+        <p:nvPr/>
+      </p:nvGrpSpPr>
+      <p:grpSpPr>
+        <a:xfrm>
+          <a:off x="0" y="0"/>
+          <a:ext cx="0" cy="0"/>
+          <a:chOff x="0" y="0"/>
+          <a:chExt cx="0" cy="0"/>
+        </a:xfrm>
+      </p:grpSpPr>
+      <p:sp>
+        <p:nvSpPr>
+          <p:cNvPr id="6" name="Rectangle 5">
+            <a:extLst>
+              <a:ext uri="{FF2B5EF4-FFF2-40B4-BE49-F238E27FC236}">
+                <a16:creationId xmlns:a16="http://schemas.microsoft.com/office/drawing/2014/main" id="{99658B2A-B5B8-C148-9715-B5BF2FFF5095}"/>
+              </a:ext>
+            </a:extLst>
+          </p:cNvPr>
+          <p:cNvSpPr/>
+          <p:nvPr/>
+        </p:nvSpPr>
+        <p:spPr>
+          <a:xfrm>
+            <a:off x="0" y="0"/>
+            <a:ext cx="18288000" cy="711200"/>
+          </a:xfrm>
+          <a:prstGeom prst="rect">
+            <a:avLst/>
+          </a:prstGeom>
+          <a:solidFill>
+            <a:schemeClr val="accent5">
+              <a:lumMod val="60000"/>
+              <a:lumOff val="40000"/>
+            </a:schemeClr>
+          </a:solidFill>
+          <a:ln>
+            <a:noFill/>
+          </a:ln>
+        </p:spPr>
+        <p:style>
+          <a:lnRef idx="2">
+            <a:schemeClr val="accent1">
+              <a:shade val="15000"/>
+            </a:schemeClr>
+          </a:lnRef>
+          <a:fillRef idx="1">
+            <a:schemeClr val="accent1"/>
+          </a:fillRef>
+          <a:effectRef idx="0">
+            <a:schemeClr val="accent1"/>
+          </a:effectRef>
+          <a:fontRef idx="minor">
+            <a:schemeClr val="lt1"/>
+          </a:fontRef>
+        </p:style>
+        <p:txBody>
+          <a:bodyPr rtlCol="0" anchor="ctr"/>
+          <a:lstStyle/>
+          <a:p>
+            <a:pPr algn="ctr"/>
+            <a:endParaRPr lang="en-US"/>
+          </a:p>
+        </p:txBody>
+      </p:sp>
+      <p:sp>
+        <p:nvSpPr>
+          <p:cNvPr id="7" name="Rectangle 6">
+            <a:extLst>
+              <a:ext uri="{FF2B5EF4-FFF2-40B4-BE49-F238E27FC236}">
+                <a16:creationId xmlns:a16="http://schemas.microsoft.com/office/drawing/2014/main" id="{8CC0C682-3FA9-67A2-4147-2BFF3E5578B2}"/>
+              </a:ext>
+            </a:extLst>
+          </p:cNvPr>
+          <p:cNvSpPr/>
+          <p:nvPr/>
+        </p:nvSpPr>
+        <p:spPr>
+          <a:xfrm>
+            <a:off x="0" y="711200"/>
+            <a:ext cx="18288000" cy="431800"/>
+          </a:xfrm>
+          <a:prstGeom prst="rect">
+            <a:avLst/>
+          </a:prstGeom>
+          <a:solidFill>
+            <a:schemeClr val="accent5">
+              <a:lumMod val="20000"/>
+              <a:lumOff val="80000"/>
+            </a:schemeClr>
+          </a:solidFill>
+          <a:ln>
+            <a:noFill/>
+          </a:ln>
+        </p:spPr>
+        <p:style>
+          <a:lnRef idx="2">
+            <a:schemeClr val="accent1">
+              <a:shade val="15000"/>
+            </a:schemeClr>
+          </a:lnRef>
+          <a:fillRef idx="1">
+            <a:schemeClr val="accent1"/>
+          </a:fillRef>
+          <a:effectRef idx="0">
+            <a:schemeClr val="accent1"/>
+          </a:effectRef>
+          <a:fontRef idx="minor">
+            <a:schemeClr val="lt1"/>
+          </a:fontRef>
+        </p:style>
+        <p:txBody>
+          <a:bodyPr rtlCol="0" anchor="ctr"/>
+          <a:lstStyle/>
+          <a:p>
+            <a:pPr algn="ctr"/>
+            <a:endParaRPr lang="en-US"/>
+          </a:p>
+        </p:txBody>
+      </p:sp>
+      <p:sp>
+        <p:nvSpPr>
+          <p:cNvPr id="8" name="Rectangle 7">
+            <a:extLst>
+              <a:ext uri="{FF2B5EF4-FFF2-40B4-BE49-F238E27FC236}">
+                <a16:creationId xmlns:a16="http://schemas.microsoft.com/office/drawing/2014/main" id="{4BFAF3C6-CE9B-F106-3309-A0952EFEF307}"/>
+              </a:ext>
+            </a:extLst>
+          </p:cNvPr>
+          <p:cNvSpPr/>
+          <p:nvPr/>
+        </p:nvSpPr>
+        <p:spPr>
+          <a:xfrm>
+            <a:off x="0" y="1143000"/>
+            <a:ext cx="18288000" cy="431800"/>
+          </a:xfrm>
+          <a:prstGeom prst="rect">
+            <a:avLst/>
+          </a:prstGeom>
+          <a:solidFill>
+            <a:schemeClr val="bg1"/>
+          </a:solidFill>
+          <a:ln>
+            <a:noFill/>
+          </a:ln>
+          <a:effectLst>
+            <a:outerShdw blurRad="50800" dist="38100" dir="5400000" algn="t" rotWithShape="0">
+              <a:prstClr val="black">
+                <a:alpha val="40000"/>
+              </a:prstClr>
+            </a:outerShdw>
+          </a:effectLst>
+        </p:spPr>
+        <p:style>
+          <a:lnRef idx="2">
+            <a:schemeClr val="accent1">
+              <a:shade val="15000"/>
+            </a:schemeClr>
+          </a:lnRef>
+          <a:fillRef idx="1">
+            <a:schemeClr val="accent1"/>
+          </a:fillRef>
+          <a:effectRef idx="0">
+            <a:schemeClr val="accent1"/>
+          </a:effectRef>
+          <a:fontRef idx="minor">
+            <a:schemeClr val="lt1"/>
+          </a:fontRef>
+        </p:style>
+        <p:txBody>
+          <a:bodyPr rtlCol="0" anchor="ctr"/>
+          <a:lstStyle/>
+          <a:p>
+            <a:pPr algn="ctr"/>
+            <a:endParaRPr lang="en-US"/>
+          </a:p>
+        </p:txBody>
+      </p:sp>
+      <p:sp>
+        <p:nvSpPr>
+          <p:cNvPr id="9" name="Rectangle: Rounded Corners 8">
+            <a:extLst>
+              <a:ext uri="{FF2B5EF4-FFF2-40B4-BE49-F238E27FC236}">
+                <a16:creationId xmlns:a16="http://schemas.microsoft.com/office/drawing/2014/main" id="{C2F0E419-BD10-4CA8-A190-89C8DB86112F}"/>
+              </a:ext>
+            </a:extLst>
+          </p:cNvPr>
+          <p:cNvSpPr/>
+          <p:nvPr/>
+        </p:nvSpPr>
+        <p:spPr>
+          <a:xfrm>
+            <a:off x="108571" y="1754192"/>
+            <a:ext cx="11224969" cy="8422178"/>
+          </a:xfrm>
+          <a:prstGeom prst="roundRect">
+            <a:avLst>
+              <a:gd name="adj" fmla="val 7996"/>
+            </a:avLst>
+          </a:prstGeom>
+          <a:solidFill>
+            <a:schemeClr val="bg1">
+              <a:lumMod val="95000"/>
+            </a:schemeClr>
+          </a:solidFill>
+          <a:ln>
+            <a:noFill/>
+          </a:ln>
+          <a:effectLst>
+            <a:innerShdw blurRad="114300">
+              <a:prstClr val="black"/>
+            </a:innerShdw>
+          </a:effectLst>
+        </p:spPr>
+        <p:style>
+          <a:lnRef idx="2">
+            <a:schemeClr val="accent1">
+              <a:shade val="15000"/>
+            </a:schemeClr>
+          </a:lnRef>
+          <a:fillRef idx="1">
+            <a:schemeClr val="accent1"/>
+          </a:fillRef>
+          <a:effectRef idx="0">
+            <a:schemeClr val="accent1"/>
+          </a:effectRef>
+          <a:fontRef idx="minor">
+            <a:schemeClr val="lt1"/>
+          </a:fontRef>
+        </p:style>
+        <p:txBody>
+          <a:bodyPr rtlCol="0" anchor="ctr"/>
+          <a:lstStyle/>
+          <a:p>
+            <a:pPr algn="ctr"/>
+            <a:endParaRPr lang="en-US" dirty="0"/>
+          </a:p>
+        </p:txBody>
+      </p:sp>
+      <p:sp>
+        <p:nvSpPr>
+          <p:cNvPr id="11" name="Rectangle: Rounded Corners 10">
+            <a:extLst>
+              <a:ext uri="{FF2B5EF4-FFF2-40B4-BE49-F238E27FC236}">
+                <a16:creationId xmlns:a16="http://schemas.microsoft.com/office/drawing/2014/main" id="{4970FEA8-9661-D48F-439B-20E589BFB1E0}"/>
+              </a:ext>
+            </a:extLst>
+          </p:cNvPr>
+          <p:cNvSpPr/>
+          <p:nvPr/>
+        </p:nvSpPr>
+        <p:spPr>
+          <a:xfrm>
+            <a:off x="11499136" y="6121264"/>
+            <a:ext cx="4504453" cy="3967580"/>
+          </a:xfrm>
+          <a:prstGeom prst="roundRect">
+            <a:avLst>
+              <a:gd name="adj" fmla="val 7996"/>
+            </a:avLst>
+          </a:prstGeom>
+          <a:solidFill>
+            <a:schemeClr val="bg1">
+              <a:lumMod val="95000"/>
+            </a:schemeClr>
+          </a:solidFill>
+          <a:ln>
+            <a:noFill/>
+          </a:ln>
+          <a:effectLst>
+            <a:innerShdw blurRad="114300">
+              <a:prstClr val="black"/>
+            </a:innerShdw>
+          </a:effectLst>
+        </p:spPr>
+        <p:style>
+          <a:lnRef idx="2">
+            <a:schemeClr val="accent1">
+              <a:shade val="15000"/>
+            </a:schemeClr>
+          </a:lnRef>
+          <a:fillRef idx="1">
+            <a:schemeClr val="accent1"/>
+          </a:fillRef>
+          <a:effectRef idx="0">
+            <a:schemeClr val="accent1"/>
+          </a:effectRef>
+          <a:fontRef idx="minor">
+            <a:schemeClr val="lt1"/>
+          </a:fontRef>
+        </p:style>
+        <p:txBody>
+          <a:bodyPr rtlCol="0" anchor="ctr"/>
+          <a:lstStyle/>
+          <a:p>
+            <a:pPr algn="ctr"/>
+            <a:endParaRPr lang="en-US" dirty="0"/>
+          </a:p>
+        </p:txBody>
+      </p:sp>
+      <p:pic>
+        <p:nvPicPr>
+          <p:cNvPr id="15" name="Picture 14" descr="A blue and black logo&#10;&#10;Description automatically generated">
+            <a:extLst>
+              <a:ext uri="{FF2B5EF4-FFF2-40B4-BE49-F238E27FC236}">
+                <a16:creationId xmlns:a16="http://schemas.microsoft.com/office/drawing/2014/main" id="{BD917A5B-41A8-D57E-9C08-939CB58606EF}"/>
+              </a:ext>
+            </a:extLst>
+          </p:cNvPr>
+          <p:cNvPicPr preferRelativeResize="0">
+            <a:picLocks noChangeAspect="1"/>
+          </p:cNvPicPr>
+          <p:nvPr/>
+        </p:nvPicPr>
+        <p:blipFill>
+          <a:blip r:embed="rId2" cstate="print">
+            <a:extLst>
+              <a:ext uri="{28A0092B-C50C-407E-A947-70E740481C1C}">
+                <a14:useLocalDpi xmlns:a14="http://schemas.microsoft.com/office/drawing/2010/main" val="0"/>
+              </a:ext>
+            </a:extLst>
+          </a:blip>
+          <a:srcRect l="27137" t="16710" r="25806" b="43169"/>
+          <a:stretch/>
+        </p:blipFill>
+        <p:spPr>
+          <a:xfrm>
+            <a:off x="111949" y="-34240"/>
+            <a:ext cx="732113" cy="732113"/>
+          </a:xfrm>
+          <a:prstGeom prst="rect">
+            <a:avLst/>
+          </a:prstGeom>
+        </p:spPr>
+      </p:pic>
+      <p:sp>
+        <p:nvSpPr>
+          <p:cNvPr id="16" name="TextBox 15">
+            <a:extLst>
+              <a:ext uri="{FF2B5EF4-FFF2-40B4-BE49-F238E27FC236}">
+                <a16:creationId xmlns:a16="http://schemas.microsoft.com/office/drawing/2014/main" id="{B6388693-779B-63CA-8C34-CF62E79BED86}"/>
+              </a:ext>
+            </a:extLst>
+          </p:cNvPr>
+          <p:cNvSpPr txBox="1"/>
+          <p:nvPr/>
+        </p:nvSpPr>
+        <p:spPr>
+          <a:xfrm>
+            <a:off x="815332" y="-22127"/>
+            <a:ext cx="5096267" cy="707886"/>
+          </a:xfrm>
+          <a:prstGeom prst="rect">
+            <a:avLst/>
+          </a:prstGeom>
+          <a:noFill/>
+        </p:spPr>
+        <p:txBody>
+          <a:bodyPr wrap="none" rtlCol="0">
+            <a:spAutoFit/>
+          </a:bodyPr>
+          <a:lstStyle/>
+          <a:p>
+            <a:r>
+              <a:rPr lang="en-US" sz="4000" b="1" dirty="0" err="1">
+                <a:solidFill>
+                  <a:schemeClr val="bg1"/>
+                </a:solidFill>
+                <a:latin typeface="Bahnschrift SemiBold SemiConden" panose="020B0502040204020203" pitchFamily="34" charset="0"/>
+              </a:rPr>
+              <a:t>TechCore</a:t>
+            </a:r>
+            <a:r>
+              <a:rPr lang="en-US" sz="4000" b="1" dirty="0">
+                <a:solidFill>
+                  <a:schemeClr val="bg1"/>
+                </a:solidFill>
+                <a:latin typeface="Bahnschrift SemiBold SemiConden" panose="020B0502040204020203" pitchFamily="34" charset="0"/>
+              </a:rPr>
+              <a:t> Innovation- HR</a:t>
+            </a:r>
+          </a:p>
+        </p:txBody>
+      </p:sp>
+      <p:sp>
+        <p:nvSpPr>
+          <p:cNvPr id="19" name="Rectangle: Rounded Corners 18">
+            <a:extLst>
+              <a:ext uri="{FF2B5EF4-FFF2-40B4-BE49-F238E27FC236}">
+                <a16:creationId xmlns:a16="http://schemas.microsoft.com/office/drawing/2014/main" id="{D4D74A61-A305-C3DE-AEE7-C101BD4D1A5D}"/>
+              </a:ext>
+            </a:extLst>
+          </p:cNvPr>
+          <p:cNvSpPr/>
+          <p:nvPr/>
+        </p:nvSpPr>
+        <p:spPr>
+          <a:xfrm>
+            <a:off x="11499136" y="1751568"/>
+            <a:ext cx="4504453" cy="4142274"/>
+          </a:xfrm>
+          <a:prstGeom prst="roundRect">
+            <a:avLst>
+              <a:gd name="adj" fmla="val 7996"/>
+            </a:avLst>
+          </a:prstGeom>
+          <a:solidFill>
+            <a:schemeClr val="bg1">
+              <a:lumMod val="95000"/>
+            </a:schemeClr>
+          </a:solidFill>
+          <a:ln>
+            <a:noFill/>
+          </a:ln>
+          <a:effectLst>
+            <a:innerShdw blurRad="114300">
+              <a:prstClr val="black"/>
+            </a:innerShdw>
+          </a:effectLst>
+        </p:spPr>
+        <p:style>
+          <a:lnRef idx="2">
+            <a:schemeClr val="accent1">
+              <a:shade val="15000"/>
+            </a:schemeClr>
+          </a:lnRef>
+          <a:fillRef idx="1">
+            <a:schemeClr val="accent1"/>
+          </a:fillRef>
+          <a:effectRef idx="0">
+            <a:schemeClr val="accent1"/>
+          </a:effectRef>
+          <a:fontRef idx="minor">
+            <a:schemeClr val="lt1"/>
+          </a:fontRef>
+        </p:style>
+        <p:txBody>
+          <a:bodyPr rtlCol="0" anchor="ctr"/>
+          <a:lstStyle/>
+          <a:p>
+            <a:pPr algn="ctr"/>
+            <a:r>
+              <a:rPr lang="en-US" dirty="0"/>
+              <a:t>V</a:t>
+            </a:r>
+          </a:p>
+        </p:txBody>
+      </p:sp>
+      <p:sp>
+        <p:nvSpPr>
+          <p:cNvPr id="20" name="Rectangle: Rounded Corners 19">
+            <a:extLst>
+              <a:ext uri="{FF2B5EF4-FFF2-40B4-BE49-F238E27FC236}">
+                <a16:creationId xmlns:a16="http://schemas.microsoft.com/office/drawing/2014/main" id="{7EC7BDF2-7881-8601-7488-CED69AF549FC}"/>
+              </a:ext>
+            </a:extLst>
+          </p:cNvPr>
+          <p:cNvSpPr/>
+          <p:nvPr/>
+        </p:nvSpPr>
+        <p:spPr>
+          <a:xfrm>
+            <a:off x="16169185" y="1776356"/>
+            <a:ext cx="1977524" cy="8312488"/>
+          </a:xfrm>
+          <a:prstGeom prst="roundRect">
+            <a:avLst>
+              <a:gd name="adj" fmla="val 7996"/>
+            </a:avLst>
+          </a:prstGeom>
+          <a:solidFill>
+            <a:schemeClr val="bg1">
+              <a:lumMod val="95000"/>
+            </a:schemeClr>
+          </a:solidFill>
+          <a:ln>
+            <a:noFill/>
+          </a:ln>
+          <a:effectLst>
+            <a:innerShdw blurRad="114300">
+              <a:prstClr val="black"/>
+            </a:innerShdw>
+          </a:effectLst>
+        </p:spPr>
+        <p:style>
+          <a:lnRef idx="2">
+            <a:schemeClr val="accent1">
+              <a:shade val="15000"/>
+            </a:schemeClr>
+          </a:lnRef>
+          <a:fillRef idx="1">
+            <a:schemeClr val="accent1"/>
+          </a:fillRef>
+          <a:effectRef idx="0">
+            <a:schemeClr val="accent1"/>
+          </a:effectRef>
+          <a:fontRef idx="minor">
+            <a:schemeClr val="lt1"/>
+          </a:fontRef>
+        </p:style>
+        <p:txBody>
+          <a:bodyPr rtlCol="0" anchor="ctr"/>
+          <a:lstStyle/>
+          <a:p>
+            <a:pPr algn="ctr"/>
+            <a:endParaRPr lang="en-US"/>
+          </a:p>
+        </p:txBody>
+      </p:sp>
+      <p:sp>
+        <p:nvSpPr>
+          <p:cNvPr id="22" name="TextBox 21">
+            <a:extLst>
+              <a:ext uri="{FF2B5EF4-FFF2-40B4-BE49-F238E27FC236}">
+                <a16:creationId xmlns:a16="http://schemas.microsoft.com/office/drawing/2014/main" id="{FDB1AC1C-AFC7-8595-AC34-A069385CC317}"/>
+              </a:ext>
+            </a:extLst>
+          </p:cNvPr>
+          <p:cNvSpPr txBox="1"/>
+          <p:nvPr/>
+        </p:nvSpPr>
+        <p:spPr>
+          <a:xfrm>
+            <a:off x="602855" y="5952364"/>
+            <a:ext cx="231154" cy="369332"/>
+          </a:xfrm>
+          <a:prstGeom prst="rect">
+            <a:avLst/>
+          </a:prstGeom>
+          <a:noFill/>
+        </p:spPr>
+        <p:txBody>
+          <a:bodyPr wrap="none" rtlCol="0">
+            <a:spAutoFit/>
+          </a:bodyPr>
+          <a:lstStyle/>
+          <a:p>
+            <a:r>
+              <a:rPr lang="en-US" b="1" dirty="0">
+                <a:solidFill>
+                  <a:schemeClr val="bg2">
+                    <a:lumMod val="25000"/>
+                  </a:schemeClr>
+                </a:solidFill>
+              </a:rPr>
+              <a:t> </a:t>
+            </a:r>
+          </a:p>
+        </p:txBody>
+      </p:sp>
+      <p:sp>
+        <p:nvSpPr>
+          <p:cNvPr id="23" name="TextBox 22">
+            <a:extLst>
+              <a:ext uri="{FF2B5EF4-FFF2-40B4-BE49-F238E27FC236}">
+                <a16:creationId xmlns:a16="http://schemas.microsoft.com/office/drawing/2014/main" id="{A5B71380-FD92-18D0-3CC1-473E663C5E72}"/>
+              </a:ext>
+            </a:extLst>
+          </p:cNvPr>
+          <p:cNvSpPr txBox="1"/>
+          <p:nvPr/>
+        </p:nvSpPr>
+        <p:spPr>
+          <a:xfrm>
+            <a:off x="11333541" y="5952363"/>
+            <a:ext cx="1766317" cy="369332"/>
+          </a:xfrm>
+          <a:prstGeom prst="rect">
+            <a:avLst/>
+          </a:prstGeom>
+          <a:noFill/>
+        </p:spPr>
+        <p:txBody>
+          <a:bodyPr wrap="square" rtlCol="0">
+            <a:spAutoFit/>
+          </a:bodyPr>
+          <a:lstStyle/>
+          <a:p>
+            <a:r>
+              <a:rPr lang="en-US" b="1" dirty="0">
+                <a:solidFill>
+                  <a:schemeClr val="bg2">
+                    <a:lumMod val="25000"/>
+                  </a:schemeClr>
+                </a:solidFill>
+              </a:rPr>
+              <a:t> </a:t>
+            </a:r>
+          </a:p>
+        </p:txBody>
+      </p:sp>
+      <p:sp>
+        <p:nvSpPr>
+          <p:cNvPr id="2" name="TextBox 1">
+            <a:extLst>
+              <a:ext uri="{FF2B5EF4-FFF2-40B4-BE49-F238E27FC236}">
+                <a16:creationId xmlns:a16="http://schemas.microsoft.com/office/drawing/2014/main" id="{91950956-2209-65C0-60B6-8E570FBF11D8}"/>
+              </a:ext>
+            </a:extLst>
+          </p:cNvPr>
+          <p:cNvSpPr txBox="1"/>
+          <p:nvPr/>
+        </p:nvSpPr>
+        <p:spPr>
+          <a:xfrm>
+            <a:off x="602855" y="1181422"/>
+            <a:ext cx="1379417" cy="369332"/>
+          </a:xfrm>
+          <a:prstGeom prst="rect">
+            <a:avLst/>
+          </a:prstGeom>
+          <a:noFill/>
+        </p:spPr>
+        <p:txBody>
+          <a:bodyPr wrap="none" rtlCol="0">
+            <a:spAutoFit/>
+          </a:bodyPr>
+          <a:lstStyle/>
+          <a:p>
+            <a:r>
+              <a:rPr lang="en-US" b="1" dirty="0">
+                <a:solidFill>
+                  <a:schemeClr val="bg2">
+                    <a:lumMod val="25000"/>
+                  </a:schemeClr>
+                </a:solidFill>
+              </a:rPr>
+              <a:t>Date Range</a:t>
+            </a:r>
+          </a:p>
+        </p:txBody>
+      </p:sp>
+      <p:sp>
+        <p:nvSpPr>
           <p:cNvPr id="5" name="TextBox 4">
             <a:extLst>
               <a:ext uri="{FF2B5EF4-FFF2-40B4-BE49-F238E27FC236}">
@@ -8466,7 +9314,7 @@
 </p:sld>
 </file>
 
-<file path=ppt/slides/slide16.xml><?xml version="1.0" encoding="utf-8"?>
+<file path=ppt/slides/slide17.xml><?xml version="1.0" encoding="utf-8"?>
 <p:sld xmlns:a="http://schemas.openxmlformats.org/drawingml/2006/main" xmlns:r="http://schemas.openxmlformats.org/officeDocument/2006/relationships" xmlns:p="http://schemas.openxmlformats.org/presentationml/2006/main">
   <p:cSld>
     <p:spTree>

</xml_diff>